<commit_message>
added changes to final presentation
</commit_message>
<xml_diff>
--- a/Energy Analysis of the United States for 2018.pptx
+++ b/Energy Analysis of the United States for 2018.pptx
@@ -13,6 +13,7 @@
     <p:sldId id="261" r:id="rId7"/>
     <p:sldId id="262" r:id="rId8"/>
     <p:sldId id="264" r:id="rId9"/>
+    <p:sldId id="266" r:id="rId10"/>
   </p:sldIdLst>
   <p:sldSz cx="12192000" cy="6858000"/>
   <p:notesSz cx="6858000" cy="9144000"/>
@@ -3376,7 +3377,7 @@
         <a:lstStyle/>
         <a:p>
           <a:r>
-            <a:rPr lang="en-US"/>
+            <a:rPr lang="en-US" dirty="0"/>
             <a:t>Evaluate the production sources in each state</a:t>
           </a:r>
         </a:p>
@@ -3412,8 +3413,8 @@
         <a:lstStyle/>
         <a:p>
           <a:r>
-            <a:rPr lang="en-US"/>
-            <a:t>Evaluate the production from renewables throughout the years</a:t>
+            <a:rPr lang="en-US" dirty="0"/>
+            <a:t>Evaluate the energy production and consumption from renewable sources over the years</a:t>
           </a:r>
         </a:p>
       </dgm:t>
@@ -3664,15 +3665,7 @@
         <a:p>
           <a:r>
             <a:rPr lang="en-US" dirty="0"/>
-            <a:t>Used pandas in </a:t>
-          </a:r>
-          <a:r>
-            <a:rPr lang="en-US" dirty="0" err="1"/>
-            <a:t>jupyter</a:t>
-          </a:r>
-          <a:r>
-            <a:rPr lang="en-US" dirty="0"/>
-            <a:t> notebook perform data cleaning; converted </a:t>
+            <a:t>Used pandas to perform data cleaning; converted </a:t>
           </a:r>
           <a:r>
             <a:rPr lang="en-US" dirty="0" err="1"/>
@@ -3751,8 +3744,24 @@
         <a:lstStyle/>
         <a:p>
           <a:r>
-            <a:rPr lang="en-US"/>
-            <a:t>Loaded data into MongoDB</a:t>
+            <a:rPr lang="en-US" dirty="0"/>
+            <a:t>Merged </a:t>
+          </a:r>
+          <a:r>
+            <a:rPr lang="en-US" dirty="0" err="1"/>
+            <a:t>geojson</a:t>
+          </a:r>
+          <a:r>
+            <a:rPr lang="en-US" dirty="0"/>
+            <a:t> for states and energy data to create unified </a:t>
+          </a:r>
+          <a:r>
+            <a:rPr lang="en-US" dirty="0" err="1"/>
+            <a:t>geojson</a:t>
+          </a:r>
+          <a:r>
+            <a:rPr lang="en-US" dirty="0"/>
+            <a:t> file for choropleth plotting</a:t>
           </a:r>
         </a:p>
       </dgm:t>
@@ -3779,6 +3788,42 @@
         </a:p>
       </dgm:t>
     </dgm:pt>
+    <dgm:pt modelId="{BA6A2658-D21C-4B63-9947-C19C9877E6FF}">
+      <dgm:prSet/>
+      <dgm:spPr/>
+      <dgm:t>
+        <a:bodyPr/>
+        <a:lstStyle/>
+        <a:p>
+          <a:r>
+            <a:rPr lang="en-US" dirty="0"/>
+            <a:t>Loaded data into MongoDB</a:t>
+          </a:r>
+        </a:p>
+      </dgm:t>
+    </dgm:pt>
+    <dgm:pt modelId="{1B3C2443-1921-4D88-A44A-6E18742FA433}" type="parTrans" cxnId="{FAF3054C-A6E7-4D64-9613-5C92DD1623A9}">
+      <dgm:prSet/>
+      <dgm:spPr/>
+      <dgm:t>
+        <a:bodyPr/>
+        <a:lstStyle/>
+        <a:p>
+          <a:endParaRPr lang="en-US"/>
+        </a:p>
+      </dgm:t>
+    </dgm:pt>
+    <dgm:pt modelId="{EDB95CB2-CBEE-4490-AB4F-AC3428205B32}" type="sibTrans" cxnId="{FAF3054C-A6E7-4D64-9613-5C92DD1623A9}">
+      <dgm:prSet/>
+      <dgm:spPr/>
+      <dgm:t>
+        <a:bodyPr/>
+        <a:lstStyle/>
+        <a:p>
+          <a:endParaRPr lang="en-US"/>
+        </a:p>
+      </dgm:t>
+    </dgm:pt>
     <dgm:pt modelId="{FC0944E1-4E68-401A-8B2B-C375CB6C720E}" type="pres">
       <dgm:prSet presAssocID="{1B182978-01A2-465D-BF4F-93583FA8CD18}" presName="linear" presStyleCnt="0">
         <dgm:presLayoutVars>
@@ -3789,7 +3834,7 @@
       <dgm:spPr/>
     </dgm:pt>
     <dgm:pt modelId="{4D2C1CC1-51EF-4EFC-AE2C-732DD0C22E36}" type="pres">
-      <dgm:prSet presAssocID="{674E7A44-DDCD-4689-8D1D-453650A46355}" presName="parentText" presStyleLbl="node1" presStyleIdx="0" presStyleCnt="3">
+      <dgm:prSet presAssocID="{674E7A44-DDCD-4689-8D1D-453650A46355}" presName="parentText" presStyleLbl="node1" presStyleIdx="0" presStyleCnt="4">
         <dgm:presLayoutVars>
           <dgm:chMax val="0"/>
           <dgm:bulletEnabled val="1"/>
@@ -3802,7 +3847,7 @@
       <dgm:spPr/>
     </dgm:pt>
     <dgm:pt modelId="{E9368434-3DE0-4DFB-A754-1479E32D3EB5}" type="pres">
-      <dgm:prSet presAssocID="{6C8A9872-0435-47D0-A65E-607B6272F633}" presName="parentText" presStyleLbl="node1" presStyleIdx="1" presStyleCnt="3">
+      <dgm:prSet presAssocID="{6C8A9872-0435-47D0-A65E-607B6272F633}" presName="parentText" presStyleLbl="node1" presStyleIdx="1" presStyleCnt="4">
         <dgm:presLayoutVars>
           <dgm:chMax val="0"/>
           <dgm:bulletEnabled val="1"/>
@@ -3815,7 +3860,20 @@
       <dgm:spPr/>
     </dgm:pt>
     <dgm:pt modelId="{E1745975-FBC3-4BD0-BE4E-BD391932F88D}" type="pres">
-      <dgm:prSet presAssocID="{03F5D0B5-889C-456E-800C-85607641D47E}" presName="parentText" presStyleLbl="node1" presStyleIdx="2" presStyleCnt="3">
+      <dgm:prSet presAssocID="{03F5D0B5-889C-456E-800C-85607641D47E}" presName="parentText" presStyleLbl="node1" presStyleIdx="2" presStyleCnt="4">
+        <dgm:presLayoutVars>
+          <dgm:chMax val="0"/>
+          <dgm:bulletEnabled val="1"/>
+        </dgm:presLayoutVars>
+      </dgm:prSet>
+      <dgm:spPr/>
+    </dgm:pt>
+    <dgm:pt modelId="{6A04F55F-469D-43FA-B991-8926B70A20BE}" type="pres">
+      <dgm:prSet presAssocID="{2F4DB7F2-B060-422A-AAE7-F63744FDAF2C}" presName="spacer" presStyleCnt="0"/>
+      <dgm:spPr/>
+    </dgm:pt>
+    <dgm:pt modelId="{24BCB33A-6837-4A63-8179-852FF4DB334C}" type="pres">
+      <dgm:prSet presAssocID="{BA6A2658-D21C-4B63-9947-C19C9877E6FF}" presName="parentText" presStyleLbl="node1" presStyleIdx="3" presStyleCnt="4">
         <dgm:presLayoutVars>
           <dgm:chMax val="0"/>
           <dgm:bulletEnabled val="1"/>
@@ -3828,8 +3886,10 @@
     <dgm:cxn modelId="{BBE69802-35C3-4ED6-A5C9-CF99595117BB}" type="presOf" srcId="{03F5D0B5-889C-456E-800C-85607641D47E}" destId="{E1745975-FBC3-4BD0-BE4E-BD391932F88D}" srcOrd="0" destOrd="0" presId="urn:microsoft.com/office/officeart/2005/8/layout/vList2"/>
     <dgm:cxn modelId="{74143342-75D8-4745-9EAE-90302353B243}" srcId="{1B182978-01A2-465D-BF4F-93583FA8CD18}" destId="{03F5D0B5-889C-456E-800C-85607641D47E}" srcOrd="2" destOrd="0" parTransId="{3973846B-E610-46B0-BE50-4D12355A6F9B}" sibTransId="{2F4DB7F2-B060-422A-AAE7-F63744FDAF2C}"/>
     <dgm:cxn modelId="{7C1BAE4B-4466-4930-BB2F-2AC42C638D87}" type="presOf" srcId="{6C8A9872-0435-47D0-A65E-607B6272F633}" destId="{E9368434-3DE0-4DFB-A754-1479E32D3EB5}" srcOrd="0" destOrd="0" presId="urn:microsoft.com/office/officeart/2005/8/layout/vList2"/>
+    <dgm:cxn modelId="{FAF3054C-A6E7-4D64-9613-5C92DD1623A9}" srcId="{1B182978-01A2-465D-BF4F-93583FA8CD18}" destId="{BA6A2658-D21C-4B63-9947-C19C9877E6FF}" srcOrd="3" destOrd="0" parTransId="{1B3C2443-1921-4D88-A44A-6E18742FA433}" sibTransId="{EDB95CB2-CBEE-4490-AB4F-AC3428205B32}"/>
     <dgm:cxn modelId="{ADB9D684-9CCD-49BA-81D4-5476CD3A523D}" type="presOf" srcId="{674E7A44-DDCD-4689-8D1D-453650A46355}" destId="{4D2C1CC1-51EF-4EFC-AE2C-732DD0C22E36}" srcOrd="0" destOrd="0" presId="urn:microsoft.com/office/officeart/2005/8/layout/vList2"/>
     <dgm:cxn modelId="{21E9DB8D-F5DF-4C50-8E47-BAEB09E80081}" srcId="{1B182978-01A2-465D-BF4F-93583FA8CD18}" destId="{6C8A9872-0435-47D0-A65E-607B6272F633}" srcOrd="1" destOrd="0" parTransId="{5CA28190-8671-4598-A91F-74D63B66044E}" sibTransId="{1BA7C814-A718-4C67-9158-2D0CE7F4E311}"/>
+    <dgm:cxn modelId="{BAA56994-9056-43AD-81FE-02D04DD050DB}" type="presOf" srcId="{BA6A2658-D21C-4B63-9947-C19C9877E6FF}" destId="{24BCB33A-6837-4A63-8179-852FF4DB334C}" srcOrd="0" destOrd="0" presId="urn:microsoft.com/office/officeart/2005/8/layout/vList2"/>
     <dgm:cxn modelId="{7E4069C7-2D22-4C1D-A1E3-09707E00B994}" type="presOf" srcId="{1B182978-01A2-465D-BF4F-93583FA8CD18}" destId="{FC0944E1-4E68-401A-8B2B-C375CB6C720E}" srcOrd="0" destOrd="0" presId="urn:microsoft.com/office/officeart/2005/8/layout/vList2"/>
     <dgm:cxn modelId="{490130DB-F5A5-4FC3-B8ED-78DCC770D2C7}" srcId="{1B182978-01A2-465D-BF4F-93583FA8CD18}" destId="{674E7A44-DDCD-4689-8D1D-453650A46355}" srcOrd="0" destOrd="0" parTransId="{AD85CE79-5768-4BA4-AA61-5DF6DC998103}" sibTransId="{A745A025-8D98-4AAE-AB6F-502733BEB270}"/>
     <dgm:cxn modelId="{F6BCD216-DA62-40F4-AF24-A9FE898002B7}" type="presParOf" srcId="{FC0944E1-4E68-401A-8B2B-C375CB6C720E}" destId="{4D2C1CC1-51EF-4EFC-AE2C-732DD0C22E36}" srcOrd="0" destOrd="0" presId="urn:microsoft.com/office/officeart/2005/8/layout/vList2"/>
@@ -3837,6 +3897,8 @@
     <dgm:cxn modelId="{7CDCB76E-03C2-482B-91B5-9E05CA28206B}" type="presParOf" srcId="{FC0944E1-4E68-401A-8B2B-C375CB6C720E}" destId="{E9368434-3DE0-4DFB-A754-1479E32D3EB5}" srcOrd="2" destOrd="0" presId="urn:microsoft.com/office/officeart/2005/8/layout/vList2"/>
     <dgm:cxn modelId="{3D7B73DA-CFFC-4E61-A39F-C9AB292C6EAA}" type="presParOf" srcId="{FC0944E1-4E68-401A-8B2B-C375CB6C720E}" destId="{512EB728-C9CD-432A-8915-C0E85B616118}" srcOrd="3" destOrd="0" presId="urn:microsoft.com/office/officeart/2005/8/layout/vList2"/>
     <dgm:cxn modelId="{2ABEB678-6F76-4D9F-81D3-FF665C13DCFD}" type="presParOf" srcId="{FC0944E1-4E68-401A-8B2B-C375CB6C720E}" destId="{E1745975-FBC3-4BD0-BE4E-BD391932F88D}" srcOrd="4" destOrd="0" presId="urn:microsoft.com/office/officeart/2005/8/layout/vList2"/>
+    <dgm:cxn modelId="{65B295C4-5694-4063-BDE2-5E02D3C9D249}" type="presParOf" srcId="{FC0944E1-4E68-401A-8B2B-C375CB6C720E}" destId="{6A04F55F-469D-43FA-B991-8926B70A20BE}" srcOrd="5" destOrd="0" presId="urn:microsoft.com/office/officeart/2005/8/layout/vList2"/>
+    <dgm:cxn modelId="{FA53F437-8197-440A-BAB2-19E67DC2A9B0}" type="presParOf" srcId="{FC0944E1-4E68-401A-8B2B-C375CB6C720E}" destId="{24BCB33A-6837-4A63-8179-852FF4DB334C}" srcOrd="6" destOrd="0" presId="urn:microsoft.com/office/officeart/2005/8/layout/vList2"/>
   </dgm:cxnLst>
   <dgm:bg/>
   <dgm:whole/>
@@ -3876,7 +3938,15 @@
           </a:pPr>
           <a:r>
             <a:rPr lang="en-US" dirty="0"/>
-            <a:t>Used Leaflet and Choropleth to present layers of production, consumption and emission using geographical location for each state.  The map can be filtered by those three variables to produces scaled visualization. </a:t>
+            <a:t>Created flask app to retrieve data from </a:t>
+          </a:r>
+          <a:r>
+            <a:rPr lang="en-US" dirty="0" err="1"/>
+            <a:t>mongodb</a:t>
+          </a:r>
+          <a:r>
+            <a:rPr lang="en-US" dirty="0"/>
+            <a:t> and create routes to pass data required for visualization</a:t>
           </a:r>
         </a:p>
       </dgm:t>
@@ -3917,15 +3987,7 @@
           </a:pPr>
           <a:r>
             <a:rPr lang="en-US" dirty="0"/>
-            <a:t>Merged </a:t>
-          </a:r>
-          <a:r>
-            <a:rPr lang="en-US" dirty="0" err="1"/>
-            <a:t>geojson</a:t>
-          </a:r>
-          <a:r>
-            <a:rPr lang="en-US" dirty="0"/>
-            <a:t> data and Json data to produce individual information for states upon clicking the state value in the map.</a:t>
+            <a:t>Used Leaflet and Choropleth to present layers of production, consumption and emission using geographical location for each state.  The map can be filtered by those three variables to produce color scaled visualization. Clicking on state feature will take user to state data page</a:t>
           </a:r>
         </a:p>
       </dgm:t>
@@ -4007,7 +4069,7 @@
           </a:pPr>
           <a:r>
             <a:rPr lang="en-US" dirty="0"/>
-            <a:t>Used d3 to produce visualization for renewable energy production throughout the years, with line marker that tracks the values and added a translate function to change between production and consumption data</a:t>
+            <a:t>Used d3 to produce visualization for renewable energy production over the years, with line marker that tracks the values and added a translate function to change between production and consumption data</a:t>
           </a:r>
         </a:p>
       </dgm:t>
@@ -4048,7 +4110,7 @@
       <dgm:spPr/>
     </dgm:pt>
     <dgm:pt modelId="{9D731D87-466F-496A-AC79-5ED66F71C7EE}" type="pres">
-      <dgm:prSet presAssocID="{864EE690-6836-4D72-9385-0FD2D3809A29}" presName="bgRect" presStyleLbl="bgShp" presStyleIdx="0" presStyleCnt="4"/>
+      <dgm:prSet presAssocID="{864EE690-6836-4D72-9385-0FD2D3809A29}" presName="bgRect" presStyleLbl="bgShp" presStyleIdx="0" presStyleCnt="4" custLinFactY="-21824" custLinFactNeighborX="-831" custLinFactNeighborY="-100000"/>
       <dgm:spPr/>
     </dgm:pt>
     <dgm:pt modelId="{17CD9889-01DF-4938-A2F2-73895BF2A800}" type="pres">
@@ -4065,6 +4127,7 @@
               </a:ext>
             </a:extLst>
           </a:blip>
+          <a:srcRect/>
           <a:stretch>
             <a:fillRect/>
           </a:stretch>
@@ -4075,7 +4138,7 @@
       </dgm:spPr>
       <dgm:extLst>
         <a:ext uri="{E40237B7-FDA0-4F09-8148-C483321AD2D9}">
-          <dgm14:cNvPr xmlns:dgm14="http://schemas.microsoft.com/office/drawing/2010/diagram" id="0" name="" descr="Leaf"/>
+          <dgm14:cNvPr xmlns:dgm14="http://schemas.microsoft.com/office/drawing/2010/diagram" id="0" name="" descr="Network diagram"/>
         </a:ext>
       </dgm:extLst>
     </dgm:pt>
@@ -4107,7 +4170,7 @@
     <dgm:pt modelId="{CA36820B-A564-47C6-B31F-41F743B2A9BF}" type="pres">
       <dgm:prSet presAssocID="{73B4D232-C01A-4951-9C30-DD4B2282AE7F}" presName="iconRect" presStyleLbl="node1" presStyleIdx="1" presStyleCnt="4"/>
       <dgm:spPr>
-        <a:blipFill>
+        <a:blipFill rotWithShape="1">
           <a:blip xmlns:r="http://schemas.openxmlformats.org/officeDocument/2006/relationships" r:embed="rId3">
             <a:extLst>
               <a:ext uri="{28A0092B-C50C-407E-A947-70E740481C1C}">
@@ -4118,6 +4181,7 @@
               </a:ext>
             </a:extLst>
           </a:blip>
+          <a:srcRect/>
           <a:stretch>
             <a:fillRect/>
           </a:stretch>
@@ -4224,6 +4288,7 @@
               </a:ext>
             </a:extLst>
           </a:blip>
+          <a:srcRect/>
           <a:stretch>
             <a:fillRect/>
           </a:stretch>
@@ -4234,7 +4299,7 @@
       </dgm:spPr>
       <dgm:extLst>
         <a:ext uri="{E40237B7-FDA0-4F09-8148-C483321AD2D9}">
-          <dgm14:cNvPr xmlns:dgm14="http://schemas.microsoft.com/office/drawing/2010/diagram" id="0" name="" descr="Windmill"/>
+          <dgm14:cNvPr xmlns:dgm14="http://schemas.microsoft.com/office/drawing/2010/diagram" id="0" name="" descr="Bar graph with upward trend"/>
         </a:ext>
       </dgm:extLst>
     </dgm:pt>
@@ -4312,18 +4377,42 @@
     </dgm:pt>
     <dgm:pt modelId="{D2B14BA4-77A2-4423-B5C0-120BC18FF5DF}">
       <dgm:prSet/>
-      <dgm:spPr/>
+      <dgm:spPr>
+        <a:solidFill>
+          <a:schemeClr val="accent3">
+            <a:lumMod val="60000"/>
+            <a:lumOff val="40000"/>
+          </a:schemeClr>
+        </a:solidFill>
+      </dgm:spPr>
       <dgm:t>
         <a:bodyPr/>
         <a:lstStyle/>
         <a:p>
           <a:r>
             <a:rPr lang="en-US" dirty="0">
-              <a:hlinkClick xmlns:r="http://schemas.openxmlformats.org/officeDocument/2006/relationships" r:id="rId1"/>
+              <a:solidFill>
+                <a:schemeClr val="accent3">
+                  <a:lumMod val="50000"/>
+                </a:schemeClr>
+              </a:solidFill>
+              <a:hlinkClick xmlns:r="http://schemas.openxmlformats.org/officeDocument/2006/relationships" r:id="rId1">
+                <a:extLst>
+                  <a:ext uri="{A12FA001-AC4F-418D-AE19-62706E023703}">
+                    <ahyp:hlinkClr xmlns:ahyp="http://schemas.microsoft.com/office/drawing/2018/hyperlinkcolor" val="tx"/>
+                  </a:ext>
+                </a:extLst>
+              </a:hlinkClick>
             </a:rPr>
-            <a:t>Energy Analysis for the US for the year 2018</a:t>
+            <a:t>US Energy Analysis for the year 2018</a:t>
           </a:r>
-          <a:endParaRPr lang="en-US" dirty="0"/>
+          <a:endParaRPr lang="en-US" dirty="0">
+            <a:solidFill>
+              <a:schemeClr val="accent3">
+                <a:lumMod val="50000"/>
+              </a:schemeClr>
+            </a:solidFill>
+          </a:endParaRPr>
         </a:p>
       </dgm:t>
     </dgm:pt>
@@ -4800,7 +4889,7 @@
             <a:buNone/>
           </a:pPr>
           <a:r>
-            <a:rPr lang="en-US" sz="2200" kern="1200"/>
+            <a:rPr lang="en-US" sz="2200" kern="1200" dirty="0"/>
             <a:t>Evaluate the production sources in each state</a:t>
           </a:r>
         </a:p>
@@ -4950,8 +5039,8 @@
             <a:buNone/>
           </a:pPr>
           <a:r>
-            <a:rPr lang="en-US" sz="2200" kern="1200"/>
-            <a:t>Evaluate the production from renewables throughout the years</a:t>
+            <a:rPr lang="en-US" sz="2200" kern="1200" dirty="0"/>
+            <a:t>Evaluate the energy production and consumption from renewable sources over the years</a:t>
           </a:r>
         </a:p>
       </dsp:txBody>
@@ -4979,8 +5068,8 @@
       </dsp:nvSpPr>
       <dsp:spPr>
         <a:xfrm>
-          <a:off x="0" y="415706"/>
-          <a:ext cx="3342053" cy="1153620"/>
+          <a:off x="0" y="441176"/>
+          <a:ext cx="3342053" cy="842400"/>
         </a:xfrm>
         <a:prstGeom prst="roundRect">
           <a:avLst/>
@@ -5043,12 +5132,12 @@
         </a:fontRef>
       </dsp:style>
       <dsp:txBody>
-        <a:bodyPr spcFirstLastPara="0" vert="horz" wrap="square" lIns="64770" tIns="64770" rIns="64770" bIns="64770" numCol="1" spcCol="1270" anchor="ctr" anchorCtr="0">
+        <a:bodyPr spcFirstLastPara="0" vert="horz" wrap="square" lIns="60960" tIns="60960" rIns="60960" bIns="60960" numCol="1" spcCol="1270" anchor="ctr" anchorCtr="0">
           <a:noAutofit/>
         </a:bodyPr>
         <a:lstStyle/>
         <a:p>
-          <a:pPr marL="0" lvl="0" indent="0" algn="l" defTabSz="755650">
+          <a:pPr marL="0" lvl="0" indent="0" algn="l" defTabSz="711200">
             <a:lnSpc>
               <a:spcPct val="90000"/>
             </a:lnSpc>
@@ -5061,30 +5150,22 @@
             <a:buNone/>
           </a:pPr>
           <a:r>
-            <a:rPr lang="en-US" sz="1700" kern="1200" dirty="0"/>
-            <a:t>Used pandas in </a:t>
+            <a:rPr lang="en-US" sz="1600" kern="1200" dirty="0"/>
+            <a:t>Used pandas to perform data cleaning; converted </a:t>
           </a:r>
           <a:r>
-            <a:rPr lang="en-US" sz="1700" kern="1200" dirty="0" err="1"/>
-            <a:t>jupyter</a:t>
-          </a:r>
-          <a:r>
-            <a:rPr lang="en-US" sz="1700" kern="1200" dirty="0"/>
-            <a:t> notebook perform data cleaning; converted </a:t>
-          </a:r>
-          <a:r>
-            <a:rPr lang="en-US" sz="1700" kern="1200" dirty="0" err="1"/>
+            <a:rPr lang="en-US" sz="1600" kern="1200" dirty="0" err="1"/>
             <a:t>NaN</a:t>
           </a:r>
           <a:r>
-            <a:rPr lang="en-US" sz="1700" kern="1200" dirty="0"/>
+            <a:rPr lang="en-US" sz="1600" kern="1200" dirty="0"/>
             <a:t> values to 0 for visualization purposes</a:t>
           </a:r>
         </a:p>
       </dsp:txBody>
       <dsp:txXfrm>
-        <a:off x="56315" y="472021"/>
-        <a:ext cx="3229423" cy="1040990"/>
+        <a:off x="41123" y="482299"/>
+        <a:ext cx="3259807" cy="760154"/>
       </dsp:txXfrm>
     </dsp:sp>
     <dsp:sp modelId="{E9368434-3DE0-4DFB-A754-1479E32D3EB5}">
@@ -5094,8 +5175,8 @@
       </dsp:nvSpPr>
       <dsp:spPr>
         <a:xfrm>
-          <a:off x="0" y="1618286"/>
-          <a:ext cx="3342053" cy="1153620"/>
+          <a:off x="0" y="1329656"/>
+          <a:ext cx="3342053" cy="842400"/>
         </a:xfrm>
         <a:prstGeom prst="roundRect">
           <a:avLst/>
@@ -5158,12 +5239,12 @@
         </a:fontRef>
       </dsp:style>
       <dsp:txBody>
-        <a:bodyPr spcFirstLastPara="0" vert="horz" wrap="square" lIns="64770" tIns="64770" rIns="64770" bIns="64770" numCol="1" spcCol="1270" anchor="ctr" anchorCtr="0">
+        <a:bodyPr spcFirstLastPara="0" vert="horz" wrap="square" lIns="60960" tIns="60960" rIns="60960" bIns="60960" numCol="1" spcCol="1270" anchor="ctr" anchorCtr="0">
           <a:noAutofit/>
         </a:bodyPr>
         <a:lstStyle/>
         <a:p>
-          <a:pPr marL="0" lvl="0" indent="0" algn="l" defTabSz="755650">
+          <a:pPr marL="0" lvl="0" indent="0" algn="l" defTabSz="711200">
             <a:lnSpc>
               <a:spcPct val="90000"/>
             </a:lnSpc>
@@ -5176,14 +5257,14 @@
             <a:buNone/>
           </a:pPr>
           <a:r>
-            <a:rPr lang="en-US" sz="1700" kern="1200"/>
+            <a:rPr lang="en-US" sz="1600" kern="1200"/>
             <a:t>Renamed columns and collections and merged some data to have fewer collections</a:t>
           </a:r>
         </a:p>
       </dsp:txBody>
       <dsp:txXfrm>
-        <a:off x="56315" y="1674601"/>
-        <a:ext cx="3229423" cy="1040990"/>
+        <a:off x="41123" y="1370779"/>
+        <a:ext cx="3259807" cy="760154"/>
       </dsp:txXfrm>
     </dsp:sp>
     <dsp:sp modelId="{E1745975-FBC3-4BD0-BE4E-BD391932F88D}">
@@ -5193,8 +5274,8 @@
       </dsp:nvSpPr>
       <dsp:spPr>
         <a:xfrm>
-          <a:off x="0" y="2820866"/>
-          <a:ext cx="3342053" cy="1153620"/>
+          <a:off x="0" y="2218136"/>
+          <a:ext cx="3342053" cy="842400"/>
         </a:xfrm>
         <a:prstGeom prst="roundRect">
           <a:avLst/>
@@ -5257,12 +5338,12 @@
         </a:fontRef>
       </dsp:style>
       <dsp:txBody>
-        <a:bodyPr spcFirstLastPara="0" vert="horz" wrap="square" lIns="64770" tIns="64770" rIns="64770" bIns="64770" numCol="1" spcCol="1270" anchor="ctr" anchorCtr="0">
+        <a:bodyPr spcFirstLastPara="0" vert="horz" wrap="square" lIns="60960" tIns="60960" rIns="60960" bIns="60960" numCol="1" spcCol="1270" anchor="ctr" anchorCtr="0">
           <a:noAutofit/>
         </a:bodyPr>
         <a:lstStyle/>
         <a:p>
-          <a:pPr marL="0" lvl="0" indent="0" algn="l" defTabSz="755650">
+          <a:pPr marL="0" lvl="0" indent="0" algn="l" defTabSz="711200">
             <a:lnSpc>
               <a:spcPct val="90000"/>
             </a:lnSpc>
@@ -5275,14 +5356,129 @@
             <a:buNone/>
           </a:pPr>
           <a:r>
-            <a:rPr lang="en-US" sz="1700" kern="1200"/>
+            <a:rPr lang="en-US" sz="1600" kern="1200" dirty="0"/>
+            <a:t>Merged </a:t>
+          </a:r>
+          <a:r>
+            <a:rPr lang="en-US" sz="1600" kern="1200" dirty="0" err="1"/>
+            <a:t>geojson</a:t>
+          </a:r>
+          <a:r>
+            <a:rPr lang="en-US" sz="1600" kern="1200" dirty="0"/>
+            <a:t> for states and energy data to create unified </a:t>
+          </a:r>
+          <a:r>
+            <a:rPr lang="en-US" sz="1600" kern="1200" dirty="0" err="1"/>
+            <a:t>geojson</a:t>
+          </a:r>
+          <a:r>
+            <a:rPr lang="en-US" sz="1600" kern="1200" dirty="0"/>
+            <a:t> file for choropleth plotting</a:t>
+          </a:r>
+        </a:p>
+      </dsp:txBody>
+      <dsp:txXfrm>
+        <a:off x="41123" y="2259259"/>
+        <a:ext cx="3259807" cy="760154"/>
+      </dsp:txXfrm>
+    </dsp:sp>
+    <dsp:sp modelId="{24BCB33A-6837-4A63-8179-852FF4DB334C}">
+      <dsp:nvSpPr>
+        <dsp:cNvPr id="0" name=""/>
+        <dsp:cNvSpPr/>
+      </dsp:nvSpPr>
+      <dsp:spPr>
+        <a:xfrm>
+          <a:off x="0" y="3106616"/>
+          <a:ext cx="3342053" cy="842400"/>
+        </a:xfrm>
+        <a:prstGeom prst="roundRect">
+          <a:avLst/>
+        </a:prstGeom>
+        <a:gradFill rotWithShape="0">
+          <a:gsLst>
+            <a:gs pos="0">
+              <a:schemeClr val="accent2">
+                <a:hueOff val="0"/>
+                <a:satOff val="0"/>
+                <a:lumOff val="0"/>
+                <a:alphaOff val="0"/>
+                <a:tint val="98000"/>
+                <a:satMod val="110000"/>
+                <a:lumMod val="104000"/>
+              </a:schemeClr>
+            </a:gs>
+            <a:gs pos="69000">
+              <a:schemeClr val="accent2">
+                <a:hueOff val="0"/>
+                <a:satOff val="0"/>
+                <a:lumOff val="0"/>
+                <a:alphaOff val="0"/>
+                <a:shade val="84000"/>
+                <a:satMod val="130000"/>
+                <a:lumMod val="92000"/>
+              </a:schemeClr>
+            </a:gs>
+            <a:gs pos="100000">
+              <a:schemeClr val="accent2">
+                <a:hueOff val="0"/>
+                <a:satOff val="0"/>
+                <a:lumOff val="0"/>
+                <a:alphaOff val="0"/>
+                <a:shade val="76000"/>
+                <a:satMod val="130000"/>
+                <a:lumMod val="88000"/>
+              </a:schemeClr>
+            </a:gs>
+          </a:gsLst>
+          <a:lin ang="5400000" scaled="0"/>
+        </a:gradFill>
+        <a:ln>
+          <a:noFill/>
+        </a:ln>
+        <a:effectLst/>
+      </dsp:spPr>
+      <dsp:style>
+        <a:lnRef idx="0">
+          <a:scrgbClr r="0" g="0" b="0"/>
+        </a:lnRef>
+        <a:fillRef idx="3">
+          <a:scrgbClr r="0" g="0" b="0"/>
+        </a:fillRef>
+        <a:effectRef idx="3">
+          <a:scrgbClr r="0" g="0" b="0"/>
+        </a:effectRef>
+        <a:fontRef idx="minor">
+          <a:schemeClr val="lt1"/>
+        </a:fontRef>
+      </dsp:style>
+      <dsp:txBody>
+        <a:bodyPr spcFirstLastPara="0" vert="horz" wrap="square" lIns="60960" tIns="60960" rIns="60960" bIns="60960" numCol="1" spcCol="1270" anchor="ctr" anchorCtr="0">
+          <a:noAutofit/>
+        </a:bodyPr>
+        <a:lstStyle/>
+        <a:p>
+          <a:pPr marL="0" lvl="0" indent="0" algn="l" defTabSz="711200">
+            <a:lnSpc>
+              <a:spcPct val="90000"/>
+            </a:lnSpc>
+            <a:spcBef>
+              <a:spcPct val="0"/>
+            </a:spcBef>
+            <a:spcAft>
+              <a:spcPct val="35000"/>
+            </a:spcAft>
+            <a:buNone/>
+          </a:pPr>
+          <a:r>
+            <a:rPr lang="en-US" sz="1600" kern="1200" dirty="0"/>
             <a:t>Loaded data into MongoDB</a:t>
           </a:r>
         </a:p>
       </dsp:txBody>
       <dsp:txXfrm>
-        <a:off x="56315" y="2877181"/>
-        <a:ext cx="3229423" cy="1040990"/>
+        <a:off x="41123" y="3147739"/>
+        <a:ext cx="3259807" cy="760154"/>
       </dsp:txXfrm>
     </dsp:sp>
   </dsp:spTree>
@@ -5304,8 +5500,8 @@
       </dsp:nvSpPr>
       <dsp:spPr>
         <a:xfrm>
-          <a:off x="0" y="1659"/>
-          <a:ext cx="7959560" cy="840949"/>
+          <a:off x="0" y="0"/>
+          <a:ext cx="8766564" cy="946291"/>
         </a:xfrm>
         <a:prstGeom prst="roundRect">
           <a:avLst>
@@ -5345,8 +5541,8 @@
       </dsp:nvSpPr>
       <dsp:spPr>
         <a:xfrm>
-          <a:off x="254387" y="190872"/>
-          <a:ext cx="462522" cy="462522"/>
+          <a:off x="286253" y="214782"/>
+          <a:ext cx="520460" cy="520460"/>
         </a:xfrm>
         <a:prstGeom prst="rect">
           <a:avLst/>
@@ -5362,6 +5558,7 @@
               </a:ext>
             </a:extLst>
           </a:blip>
+          <a:srcRect/>
           <a:stretch>
             <a:fillRect/>
           </a:stretch>
@@ -5394,8 +5591,8 @@
       </dsp:nvSpPr>
       <dsp:spPr>
         <a:xfrm>
-          <a:off x="971296" y="1659"/>
-          <a:ext cx="6988263" cy="840949"/>
+          <a:off x="1092966" y="1867"/>
+          <a:ext cx="7673597" cy="946291"/>
         </a:xfrm>
         <a:prstGeom prst="rect">
           <a:avLst/>
@@ -5419,12 +5616,12 @@
         <a:fontRef idx="minor"/>
       </dsp:style>
       <dsp:txBody>
-        <a:bodyPr spcFirstLastPara="0" vert="horz" wrap="square" lIns="89000" tIns="89000" rIns="89000" bIns="89000" numCol="1" spcCol="1270" anchor="ctr" anchorCtr="0">
+        <a:bodyPr spcFirstLastPara="0" vert="horz" wrap="square" lIns="100149" tIns="100149" rIns="100149" bIns="100149" numCol="1" spcCol="1270" anchor="ctr" anchorCtr="0">
           <a:noAutofit/>
         </a:bodyPr>
         <a:lstStyle/>
         <a:p>
-          <a:pPr marL="0" lvl="0" indent="0" algn="l" defTabSz="666750">
+          <a:pPr marL="0" lvl="0" indent="0" algn="l" defTabSz="622300">
             <a:lnSpc>
               <a:spcPct val="100000"/>
             </a:lnSpc>
@@ -5437,14 +5634,22 @@
             <a:buNone/>
           </a:pPr>
           <a:r>
-            <a:rPr lang="en-US" sz="1500" kern="1200" dirty="0"/>
-            <a:t>Used Leaflet and Choropleth to present layers of production, consumption and emission using geographical location for each state.  The map can be filtered by those three variables to produces scaled visualization. </a:t>
+            <a:rPr lang="en-US" sz="1400" kern="1200" dirty="0"/>
+            <a:t>Created flask app to retrieve data from </a:t>
+          </a:r>
+          <a:r>
+            <a:rPr lang="en-US" sz="1400" kern="1200" dirty="0" err="1"/>
+            <a:t>mongodb</a:t>
+          </a:r>
+          <a:r>
+            <a:rPr lang="en-US" sz="1400" kern="1200" dirty="0"/>
+            <a:t> and create routes to pass data required for visualization</a:t>
           </a:r>
         </a:p>
       </dsp:txBody>
       <dsp:txXfrm>
-        <a:off x="971296" y="1659"/>
-        <a:ext cx="6988263" cy="840949"/>
+        <a:off x="1092966" y="1867"/>
+        <a:ext cx="7673597" cy="946291"/>
       </dsp:txXfrm>
     </dsp:sp>
     <dsp:sp modelId="{BCE3875D-949D-49E2-A635-E7700955F2C0}">
@@ -5454,8 +5659,8 @@
       </dsp:nvSpPr>
       <dsp:spPr>
         <a:xfrm>
-          <a:off x="0" y="1052845"/>
-          <a:ext cx="7959560" cy="840949"/>
+          <a:off x="0" y="1184731"/>
+          <a:ext cx="8766564" cy="946291"/>
         </a:xfrm>
         <a:prstGeom prst="roundRect">
           <a:avLst>
@@ -5495,13 +5700,13 @@
       </dsp:nvSpPr>
       <dsp:spPr>
         <a:xfrm>
-          <a:off x="254387" y="1242059"/>
-          <a:ext cx="462522" cy="462522"/>
+          <a:off x="286253" y="1397646"/>
+          <a:ext cx="520460" cy="520460"/>
         </a:xfrm>
         <a:prstGeom prst="rect">
           <a:avLst/>
         </a:prstGeom>
-        <a:blipFill>
+        <a:blipFill rotWithShape="1">
           <a:blip xmlns:r="http://schemas.openxmlformats.org/officeDocument/2006/relationships" r:embed="rId3">
             <a:extLst>
               <a:ext uri="{28A0092B-C50C-407E-A947-70E740481C1C}">
@@ -5512,6 +5717,7 @@
               </a:ext>
             </a:extLst>
           </a:blip>
+          <a:srcRect/>
           <a:stretch>
             <a:fillRect/>
           </a:stretch>
@@ -5544,8 +5750,8 @@
       </dsp:nvSpPr>
       <dsp:spPr>
         <a:xfrm>
-          <a:off x="971296" y="1052845"/>
-          <a:ext cx="6988263" cy="840949"/>
+          <a:off x="1092966" y="1184731"/>
+          <a:ext cx="7673597" cy="946291"/>
         </a:xfrm>
         <a:prstGeom prst="rect">
           <a:avLst/>
@@ -5569,12 +5775,12 @@
         <a:fontRef idx="minor"/>
       </dsp:style>
       <dsp:txBody>
-        <a:bodyPr spcFirstLastPara="0" vert="horz" wrap="square" lIns="89000" tIns="89000" rIns="89000" bIns="89000" numCol="1" spcCol="1270" anchor="ctr" anchorCtr="0">
+        <a:bodyPr spcFirstLastPara="0" vert="horz" wrap="square" lIns="100149" tIns="100149" rIns="100149" bIns="100149" numCol="1" spcCol="1270" anchor="ctr" anchorCtr="0">
           <a:noAutofit/>
         </a:bodyPr>
         <a:lstStyle/>
         <a:p>
-          <a:pPr marL="0" lvl="0" indent="0" algn="l" defTabSz="666750">
+          <a:pPr marL="0" lvl="0" indent="0" algn="l" defTabSz="622300">
             <a:lnSpc>
               <a:spcPct val="100000"/>
             </a:lnSpc>
@@ -5587,22 +5793,14 @@
             <a:buNone/>
           </a:pPr>
           <a:r>
-            <a:rPr lang="en-US" sz="1500" kern="1200" dirty="0"/>
-            <a:t>Merged </a:t>
-          </a:r>
-          <a:r>
-            <a:rPr lang="en-US" sz="1500" kern="1200" dirty="0" err="1"/>
-            <a:t>geojson</a:t>
-          </a:r>
-          <a:r>
-            <a:rPr lang="en-US" sz="1500" kern="1200" dirty="0"/>
-            <a:t> data and Json data to produce individual information for states upon clicking the state value in the map.</a:t>
+            <a:rPr lang="en-US" sz="1400" kern="1200" dirty="0"/>
+            <a:t>Used Leaflet and Choropleth to present layers of production, consumption and emission using geographical location for each state.  The map can be filtered by those three variables to produce color scaled visualization. Clicking on state feature will take user to state data page</a:t>
           </a:r>
         </a:p>
       </dsp:txBody>
       <dsp:txXfrm>
-        <a:off x="971296" y="1052845"/>
-        <a:ext cx="6988263" cy="840949"/>
+        <a:off x="1092966" y="1184731"/>
+        <a:ext cx="7673597" cy="946291"/>
       </dsp:txXfrm>
     </dsp:sp>
     <dsp:sp modelId="{BD7D0C7B-0C15-4CAF-9C5A-D97754D10D8F}">
@@ -5612,8 +5810,8 @@
       </dsp:nvSpPr>
       <dsp:spPr>
         <a:xfrm>
-          <a:off x="0" y="2104032"/>
-          <a:ext cx="7959560" cy="840949"/>
+          <a:off x="0" y="2367595"/>
+          <a:ext cx="8766564" cy="946291"/>
         </a:xfrm>
         <a:prstGeom prst="roundRect">
           <a:avLst>
@@ -5653,8 +5851,8 @@
       </dsp:nvSpPr>
       <dsp:spPr>
         <a:xfrm>
-          <a:off x="254387" y="2293246"/>
-          <a:ext cx="462522" cy="462522"/>
+          <a:off x="286253" y="2580510"/>
+          <a:ext cx="520460" cy="520460"/>
         </a:xfrm>
         <a:prstGeom prst="rect">
           <a:avLst/>
@@ -5702,8 +5900,8 @@
       </dsp:nvSpPr>
       <dsp:spPr>
         <a:xfrm>
-          <a:off x="971296" y="2104032"/>
-          <a:ext cx="6988263" cy="840949"/>
+          <a:off x="1092966" y="2367595"/>
+          <a:ext cx="7673597" cy="946291"/>
         </a:xfrm>
         <a:prstGeom prst="rect">
           <a:avLst/>
@@ -5727,12 +5925,12 @@
         <a:fontRef idx="minor"/>
       </dsp:style>
       <dsp:txBody>
-        <a:bodyPr spcFirstLastPara="0" vert="horz" wrap="square" lIns="89000" tIns="89000" rIns="89000" bIns="89000" numCol="1" spcCol="1270" anchor="ctr" anchorCtr="0">
+        <a:bodyPr spcFirstLastPara="0" vert="horz" wrap="square" lIns="100149" tIns="100149" rIns="100149" bIns="100149" numCol="1" spcCol="1270" anchor="ctr" anchorCtr="0">
           <a:noAutofit/>
         </a:bodyPr>
         <a:lstStyle/>
         <a:p>
-          <a:pPr marL="0" lvl="0" indent="0" algn="l" defTabSz="666750">
+          <a:pPr marL="0" lvl="0" indent="0" algn="l" defTabSz="622300">
             <a:lnSpc>
               <a:spcPct val="100000"/>
             </a:lnSpc>
@@ -5745,14 +5943,14 @@
             <a:buNone/>
           </a:pPr>
           <a:r>
-            <a:rPr lang="en-US" sz="1500" kern="1200" dirty="0"/>
+            <a:rPr lang="en-US" sz="1400" kern="1200" dirty="0"/>
             <a:t>Used a new library charts.js to produce visualizations for state production by source and used d3 to produce filter with dropdown of list of state and be able to change state within page</a:t>
           </a:r>
         </a:p>
       </dsp:txBody>
       <dsp:txXfrm>
-        <a:off x="971296" y="2104032"/>
-        <a:ext cx="6988263" cy="840949"/>
+        <a:off x="1092966" y="2367595"/>
+        <a:ext cx="7673597" cy="946291"/>
       </dsp:txXfrm>
     </dsp:sp>
     <dsp:sp modelId="{0BF87523-1BBC-4F0A-ABEB-7FB61BBEEF4C}">
@@ -5762,8 +5960,8 @@
       </dsp:nvSpPr>
       <dsp:spPr>
         <a:xfrm>
-          <a:off x="0" y="3155219"/>
-          <a:ext cx="7959560" cy="840949"/>
+          <a:off x="0" y="3550459"/>
+          <a:ext cx="8766564" cy="946291"/>
         </a:xfrm>
         <a:prstGeom prst="roundRect">
           <a:avLst>
@@ -5803,8 +6001,8 @@
       </dsp:nvSpPr>
       <dsp:spPr>
         <a:xfrm>
-          <a:off x="254387" y="3344432"/>
-          <a:ext cx="462522" cy="462522"/>
+          <a:off x="286253" y="3763375"/>
+          <a:ext cx="520460" cy="520460"/>
         </a:xfrm>
         <a:prstGeom prst="rect">
           <a:avLst/>
@@ -5820,6 +6018,7 @@
               </a:ext>
             </a:extLst>
           </a:blip>
+          <a:srcRect/>
           <a:stretch>
             <a:fillRect/>
           </a:stretch>
@@ -5852,8 +6051,8 @@
       </dsp:nvSpPr>
       <dsp:spPr>
         <a:xfrm>
-          <a:off x="971296" y="3155219"/>
-          <a:ext cx="6988263" cy="840949"/>
+          <a:off x="1092966" y="3550459"/>
+          <a:ext cx="7673597" cy="946291"/>
         </a:xfrm>
         <a:prstGeom prst="rect">
           <a:avLst/>
@@ -5877,12 +6076,12 @@
         <a:fontRef idx="minor"/>
       </dsp:style>
       <dsp:txBody>
-        <a:bodyPr spcFirstLastPara="0" vert="horz" wrap="square" lIns="89000" tIns="89000" rIns="89000" bIns="89000" numCol="1" spcCol="1270" anchor="ctr" anchorCtr="0">
+        <a:bodyPr spcFirstLastPara="0" vert="horz" wrap="square" lIns="100149" tIns="100149" rIns="100149" bIns="100149" numCol="1" spcCol="1270" anchor="ctr" anchorCtr="0">
           <a:noAutofit/>
         </a:bodyPr>
         <a:lstStyle/>
         <a:p>
-          <a:pPr marL="0" lvl="0" indent="0" algn="l" defTabSz="666750">
+          <a:pPr marL="0" lvl="0" indent="0" algn="l" defTabSz="622300">
             <a:lnSpc>
               <a:spcPct val="100000"/>
             </a:lnSpc>
@@ -5895,14 +6094,14 @@
             <a:buNone/>
           </a:pPr>
           <a:r>
-            <a:rPr lang="en-US" sz="1500" kern="1200" dirty="0"/>
-            <a:t>Used d3 to produce visualization for renewable energy production throughout the years, with line marker that tracks the values and added a translate function to change between production and consumption data</a:t>
+            <a:rPr lang="en-US" sz="1400" kern="1200" dirty="0"/>
+            <a:t>Used d3 to produce visualization for renewable energy production over the years, with line marker that tracks the values and added a translate function to change between production and consumption data</a:t>
           </a:r>
         </a:p>
       </dsp:txBody>
       <dsp:txXfrm>
-        <a:off x="971296" y="3155219"/>
-        <a:ext cx="6988263" cy="840949"/>
+        <a:off x="1092966" y="3550459"/>
+        <a:ext cx="7673597" cy="946291"/>
       </dsp:txXfrm>
     </dsp:sp>
   </dsp:spTree>
@@ -5935,10 +6134,8 @@
         </a:prstGeom>
         <a:solidFill>
           <a:schemeClr val="accent3">
-            <a:hueOff val="0"/>
-            <a:satOff val="0"/>
-            <a:lumOff val="0"/>
-            <a:alphaOff val="0"/>
+            <a:lumMod val="60000"/>
+            <a:lumOff val="40000"/>
           </a:schemeClr>
         </a:solidFill>
         <a:ln w="22225" cap="flat" cmpd="sng" algn="ctr">
@@ -5969,12 +6166,12 @@
         </a:fontRef>
       </dsp:style>
       <dsp:txBody>
-        <a:bodyPr spcFirstLastPara="0" vert="horz" wrap="square" lIns="72390" tIns="72390" rIns="72390" bIns="72390" numCol="1" spcCol="1270" anchor="ctr" anchorCtr="0">
+        <a:bodyPr spcFirstLastPara="0" vert="horz" wrap="square" lIns="76200" tIns="76200" rIns="76200" bIns="76200" numCol="1" spcCol="1270" anchor="ctr" anchorCtr="0">
           <a:noAutofit/>
         </a:bodyPr>
         <a:lstStyle/>
         <a:p>
-          <a:pPr marL="0" lvl="0" indent="0" algn="ctr" defTabSz="844550">
+          <a:pPr marL="0" lvl="0" indent="0" algn="ctr" defTabSz="889000">
             <a:lnSpc>
               <a:spcPct val="90000"/>
             </a:lnSpc>
@@ -5987,12 +6184,29 @@
             <a:buNone/>
           </a:pPr>
           <a:r>
-            <a:rPr lang="en-US" sz="1900" kern="1200" dirty="0">
-              <a:hlinkClick xmlns:r="http://schemas.openxmlformats.org/officeDocument/2006/relationships" r:id="rId1"/>
+            <a:rPr lang="en-US" sz="2000" kern="1200" dirty="0">
+              <a:solidFill>
+                <a:schemeClr val="accent3">
+                  <a:lumMod val="50000"/>
+                </a:schemeClr>
+              </a:solidFill>
+              <a:hlinkClick xmlns:r="http://schemas.openxmlformats.org/officeDocument/2006/relationships" r:id="rId1">
+                <a:extLst>
+                  <a:ext uri="{A12FA001-AC4F-418D-AE19-62706E023703}">
+                    <ahyp:hlinkClr xmlns:ahyp="http://schemas.microsoft.com/office/drawing/2018/hyperlinkcolor" val="tx"/>
+                  </a:ext>
+                </a:extLst>
+              </a:hlinkClick>
             </a:rPr>
-            <a:t>Energy Analysis for the US for the year 2018</a:t>
+            <a:t>US Energy Analysis for the year 2018</a:t>
           </a:r>
-          <a:endParaRPr lang="en-US" sz="1900" kern="1200" dirty="0"/>
+          <a:endParaRPr lang="en-US" sz="2000" kern="1200" dirty="0">
+            <a:solidFill>
+              <a:schemeClr val="accent3">
+                <a:lumMod val="50000"/>
+              </a:schemeClr>
+            </a:solidFill>
+          </a:endParaRPr>
         </a:p>
       </dsp:txBody>
       <dsp:txXfrm rot="-5400000">
@@ -6161,12 +6375,12 @@
         </a:fontRef>
       </dsp:style>
       <dsp:txBody>
-        <a:bodyPr spcFirstLastPara="0" vert="horz" wrap="square" lIns="72390" tIns="72390" rIns="72390" bIns="72390" numCol="1" spcCol="1270" anchor="ctr" anchorCtr="0">
+        <a:bodyPr spcFirstLastPara="0" vert="horz" wrap="square" lIns="76200" tIns="76200" rIns="76200" bIns="76200" numCol="1" spcCol="1270" anchor="ctr" anchorCtr="0">
           <a:noAutofit/>
         </a:bodyPr>
         <a:lstStyle/>
         <a:p>
-          <a:pPr marL="0" lvl="0" indent="0" algn="ctr" defTabSz="844550">
+          <a:pPr marL="0" lvl="0" indent="0" algn="ctr" defTabSz="889000">
             <a:lnSpc>
               <a:spcPct val="90000"/>
             </a:lnSpc>
@@ -6178,7 +6392,7 @@
             </a:spcAft>
             <a:buNone/>
           </a:pPr>
-          <a:endParaRPr lang="en-US" sz="1900" kern="1200" dirty="0"/>
+          <a:endParaRPr lang="en-US" sz="2000" kern="1200" dirty="0"/>
         </a:p>
       </dsp:txBody>
       <dsp:txXfrm rot="-5400000">
@@ -15966,8 +16180,8 @@
         </p:nvSpPr>
         <p:spPr>
           <a:xfrm>
-            <a:off x="2243667" y="2268786"/>
-            <a:ext cx="6324599" cy="1160213"/>
+            <a:off x="1639614" y="2268786"/>
+            <a:ext cx="6928653" cy="1160213"/>
           </a:xfrm>
         </p:spPr>
         <p:txBody>
@@ -15984,15 +16198,7 @@
           <a:p>
             <a:r>
               <a:rPr lang="en-US" dirty="0"/>
-              <a:t>Vipul </a:t>
-            </a:r>
-            <a:r>
-              <a:rPr lang="en-US" dirty="0" err="1"/>
-              <a:t>Aggarval</a:t>
-            </a:r>
-            <a:r>
-              <a:rPr lang="en-US" dirty="0"/>
-              <a:t>, </a:t>
+              <a:t>Vipul Aggarwal, </a:t>
             </a:r>
             <a:r>
               <a:rPr lang="en-US" dirty="0" err="1"/>
@@ -16004,7 +16210,7 @@
             </a:r>
             <a:r>
               <a:rPr lang="en-US" dirty="0" err="1"/>
-              <a:t>Phad</a:t>
+              <a:t>Phadoungxath</a:t>
             </a:r>
             <a:r>
               <a:rPr lang="en-US" dirty="0"/>
@@ -16094,13 +16300,13 @@
           <a:p>
             <a:r>
               <a:rPr lang="en-US" dirty="0"/>
-              <a:t>The increasing demand for energy in our modern world and how to satisfy it is a question that concerns the population and our leaders in a political, engineering and sustainability aspect. </a:t>
+              <a:t>The increasing demand for energy in our modern world and how to satisfy it is a question that concerns the population and our leaders from a political, engineering and sustainability perspective. </a:t>
             </a:r>
           </a:p>
           <a:p>
             <a:r>
               <a:rPr lang="en-US" dirty="0"/>
-              <a:t>The scope of this project is aimed at understanding the production and consumption of energy in the US, based on data for 2018. Where is it being produced? Where is it being consumed? What are the sources of the energy that we are consuming? And how is the role of renewables changing throughout the years?</a:t>
+              <a:t>The scope of this project is aimed at understanding the production and consumption of energy in the US, based on data for 2018. Where is it being produced? Where is it being consumed? What are the sources of the energy that we are consuming? And how is the role of renewables changing over the years?</a:t>
             </a:r>
           </a:p>
         </p:txBody>
@@ -16414,7 +16620,7 @@
             <p:ph idx="1"/>
             <p:extLst>
               <p:ext uri="{D42A27DB-BD31-4B8C-83A1-F6EECF244321}">
-                <p14:modId xmlns:p14="http://schemas.microsoft.com/office/powerpoint/2010/main" val="1179825398"/>
+                <p14:modId xmlns:p14="http://schemas.microsoft.com/office/powerpoint/2010/main" val="2656004852"/>
               </p:ext>
             </p:extLst>
           </p:nvPr>
@@ -16511,6 +16717,10 @@
           <a:lstStyle/>
           <a:p>
             <a:r>
+              <a:rPr lang="en-US" dirty="0"/>
+              <a:t>US Energy Information Administration </a:t>
+            </a:r>
+            <a:r>
               <a:rPr lang="en-US" dirty="0">
                 <a:hlinkClick r:id="rId2"/>
               </a:rPr>
@@ -16521,13 +16731,13 @@
           <a:p>
             <a:r>
               <a:rPr lang="en-US" dirty="0"/>
-              <a:t>Energy Data for each State for 2018</a:t>
+              <a:t>Energy production and consumption for each State for 2018</a:t>
             </a:r>
           </a:p>
           <a:p>
             <a:r>
               <a:rPr lang="en-US" dirty="0"/>
-              <a:t>Emission data for each State for 2017</a:t>
+              <a:t>CO2 Emission data for each State for 2018</a:t>
             </a:r>
           </a:p>
           <a:p>
@@ -16540,6 +16750,16 @@
             <a:r>
               <a:rPr lang="en-US" dirty="0"/>
               <a:t>Renewable energy production by source from 1950-2018</a:t>
+            </a:r>
+          </a:p>
+          <a:p>
+            <a:r>
+              <a:rPr lang="en-US" dirty="0" err="1"/>
+              <a:t>Geojson</a:t>
+            </a:r>
+            <a:r>
+              <a:rPr lang="en-US" dirty="0"/>
+              <a:t> for US State geography. </a:t>
             </a:r>
           </a:p>
           <a:p>
@@ -16956,12 +17176,10 @@
           </a:bodyPr>
           <a:lstStyle/>
           <a:p>
-            <a:pPr algn="l"/>
             <a:r>
               <a:rPr lang="en-US" dirty="0"/>
               <a:t>ETL</a:t>
             </a:r>
-            <a:endParaRPr lang="en-US"/>
           </a:p>
         </p:txBody>
       </p:sp>
@@ -17106,7 +17324,7 @@
             <p:ph idx="1"/>
             <p:extLst>
               <p:ext uri="{D42A27DB-BD31-4B8C-83A1-F6EECF244321}">
-                <p14:modId xmlns:p14="http://schemas.microsoft.com/office/powerpoint/2010/main" val="3352346115"/>
+                <p14:modId xmlns:p14="http://schemas.microsoft.com/office/powerpoint/2010/main" val="3215146141"/>
               </p:ext>
             </p:extLst>
           </p:nvPr>
@@ -17391,9 +17609,8 @@
           </a:bodyPr>
           <a:lstStyle/>
           <a:p>
-            <a:pPr algn="l"/>
             <a:r>
-              <a:rPr lang="en-US"/>
+              <a:rPr lang="en-US" dirty="0"/>
               <a:t>Visualization coding</a:t>
             </a:r>
           </a:p>
@@ -17541,14 +17758,14 @@
             <p:ph idx="1"/>
             <p:extLst>
               <p:ext uri="{D42A27DB-BD31-4B8C-83A1-F6EECF244321}">
-                <p14:modId xmlns:p14="http://schemas.microsoft.com/office/powerpoint/2010/main" val="3259773459"/>
+                <p14:modId xmlns:p14="http://schemas.microsoft.com/office/powerpoint/2010/main" val="2066720270"/>
               </p:ext>
             </p:extLst>
           </p:nvPr>
         </p:nvGraphicFramePr>
         <p:xfrm>
-          <a:off x="2610579" y="2052116"/>
-          <a:ext cx="7959560" cy="3997828"/>
+          <a:off x="2049518" y="1551326"/>
+          <a:ext cx="8766564" cy="4498618"/>
         </p:xfrm>
         <a:graphic>
           <a:graphicData uri="http://schemas.openxmlformats.org/drawingml/2006/diagram">
@@ -17826,7 +18043,6 @@
           </a:bodyPr>
           <a:lstStyle/>
           <a:p>
-            <a:pPr algn="l"/>
             <a:r>
               <a:rPr lang="en-US" dirty="0"/>
               <a:t>Demo</a:t>
@@ -17976,7 +18192,7 @@
             <p:ph idx="1"/>
             <p:extLst>
               <p:ext uri="{D42A27DB-BD31-4B8C-83A1-F6EECF244321}">
-                <p14:modId xmlns:p14="http://schemas.microsoft.com/office/powerpoint/2010/main" val="2940041813"/>
+                <p14:modId xmlns:p14="http://schemas.microsoft.com/office/powerpoint/2010/main" val="1380021376"/>
               </p:ext>
             </p:extLst>
           </p:nvPr>
@@ -18065,7 +18281,12 @@
             <p:ph idx="1"/>
           </p:nvPr>
         </p:nvSpPr>
-        <p:spPr/>
+        <p:spPr>
+          <a:xfrm>
+            <a:off x="2611808" y="1734207"/>
+            <a:ext cx="7958331" cy="4315737"/>
+          </a:xfrm>
+        </p:spPr>
         <p:txBody>
           <a:bodyPr>
             <a:normAutofit fontScale="77500" lnSpcReduction="20000"/>
@@ -18074,7 +18295,7 @@
           <a:p>
             <a:r>
               <a:rPr lang="en-US" dirty="0"/>
-              <a:t>Texas is the state with the largest production producing 433 million BTU, equally producing the highest emissions, but it’s only 6</a:t>
+              <a:t>Texas is the state with the largest production, producing 433 million BTU, equally producing the highest CO2 emissions, but it’s only 6</a:t>
             </a:r>
             <a:r>
               <a:rPr lang="en-US" baseline="30000" dirty="0"/>
@@ -18082,19 +18303,19 @@
             </a:r>
             <a:r>
               <a:rPr lang="en-US" dirty="0"/>
-              <a:t> in consumption. With coal and natural gas amounting for almost two thirds of the production. </a:t>
+              <a:t> in consumption. Additionally,  coal and natural gas amounts to almost two thirds of the production. </a:t>
             </a:r>
           </a:p>
           <a:p>
             <a:r>
               <a:rPr lang="en-US" dirty="0"/>
-              <a:t>Wyoming is ranked at the top of the consumption per capita data, this is in part because of the low population compared to the large energy consumed by it’s natural gas, crude oil and coil extraction industry. </a:t>
+              <a:t>Wyoming is ranked at the top of the consumption per capita data, this is in part because of the low population compared to the large energy consumed by its natural gas, crude oil and coal extraction industry. </a:t>
             </a:r>
           </a:p>
           <a:p>
             <a:r>
               <a:rPr lang="en-US" dirty="0"/>
-              <a:t>New York ranked 19 in production and 50 in the consumption rank.</a:t>
+              <a:t>New York ranked 19 in production and 50 in the consumption per capita. This is partly because of the high density and because the nature of its industries.</a:t>
             </a:r>
           </a:p>
           <a:p>
@@ -18106,7 +18327,7 @@
           <a:p>
             <a:r>
               <a:rPr lang="en-US" dirty="0"/>
-              <a:t>Solar, wind and “newer” renewable energy sources are not shown in the map, showing also the small share they have for the broad spectrum of energy sources in the US currently. </a:t>
+              <a:t>Solar, wind and “newer” renewable energy sources are not shown in the graph, showing also the small share they have for the broad spectrum of energy sources in the US currently. </a:t>
             </a:r>
           </a:p>
           <a:p>
@@ -18118,6 +18339,1302 @@
     <p:extLst>
       <p:ext uri="{BB962C8B-B14F-4D97-AF65-F5344CB8AC3E}">
         <p14:creationId xmlns:p14="http://schemas.microsoft.com/office/powerpoint/2010/main" val="971627836"/>
+      </p:ext>
+    </p:extLst>
+  </p:cSld>
+  <p:clrMapOvr>
+    <a:masterClrMapping/>
+  </p:clrMapOvr>
+</p:sld>
+</file>
+
+<file path=ppt/slides/slide9.xml><?xml version="1.0" encoding="utf-8"?>
+<p:sld xmlns:a="http://schemas.openxmlformats.org/drawingml/2006/main" xmlns:r="http://schemas.openxmlformats.org/officeDocument/2006/relationships" xmlns:p="http://schemas.openxmlformats.org/presentationml/2006/main">
+  <p:cSld>
+    <p:bg>
+      <p:bgPr>
+        <a:blipFill rotWithShape="1">
+          <a:blip r:embed="rId2"/>
+          <a:stretch/>
+        </a:blipFill>
+        <a:effectLst/>
+      </p:bgPr>
+    </p:bg>
+    <p:spTree>
+      <p:nvGrpSpPr>
+        <p:cNvPr id="1" name=""/>
+        <p:cNvGrpSpPr/>
+        <p:nvPr/>
+      </p:nvGrpSpPr>
+      <p:grpSpPr>
+        <a:xfrm>
+          <a:off x="0" y="0"/>
+          <a:ext cx="0" cy="0"/>
+          <a:chOff x="0" y="0"/>
+          <a:chExt cx="0" cy="0"/>
+        </a:xfrm>
+      </p:grpSpPr>
+      <p:pic>
+        <p:nvPicPr>
+          <p:cNvPr id="8" name="Picture 7">
+            <a:extLst>
+              <a:ext uri="{FF2B5EF4-FFF2-40B4-BE49-F238E27FC236}">
+                <a16:creationId xmlns:a16="http://schemas.microsoft.com/office/drawing/2014/main" id="{3DBBA26C-89C3-411F-9753-606A413F89AF}"/>
+              </a:ext>
+              <a:ext uri="{C183D7F6-B498-43B3-948B-1728B52AA6E4}">
+                <adec:decorative xmlns:adec="http://schemas.microsoft.com/office/drawing/2017/decorative" val="1"/>
+              </a:ext>
+            </a:extLst>
+          </p:cNvPr>
+          <p:cNvPicPr>
+            <a:picLocks noGrp="1" noRot="1" noChangeAspect="1" noMove="1" noResize="1" noEditPoints="1" noAdjustHandles="1" noChangeArrowheads="1" noChangeShapeType="1" noCrop="1"/>
+          </p:cNvPicPr>
+          <p:nvPr>
+            <p:extLst>
+              <p:ext uri="{386F3935-93C4-4BCD-93E2-E3B085C9AB24}">
+                <p16:designElem xmlns:p16="http://schemas.microsoft.com/office/powerpoint/2015/main" val="1"/>
+              </p:ext>
+            </p:extLst>
+          </p:nvPr>
+        </p:nvPicPr>
+        <p:blipFill>
+          <a:blip r:embed="rId3">
+            <a:extLst>
+              <a:ext uri="{28A0092B-C50C-407E-A947-70E740481C1C}">
+                <a14:useLocalDpi xmlns:a14="http://schemas.microsoft.com/office/drawing/2010/main" val="0"/>
+              </a:ext>
+            </a:extLst>
+          </a:blip>
+          <a:stretch>
+            <a:fillRect/>
+          </a:stretch>
+        </p:blipFill>
+        <p:spPr>
+          <a:xfrm>
+            <a:off x="2831794" y="2105202"/>
+            <a:ext cx="9360205" cy="4752798"/>
+          </a:xfrm>
+          <a:prstGeom prst="rect">
+            <a:avLst/>
+          </a:prstGeom>
+        </p:spPr>
+      </p:pic>
+      <p:pic>
+        <p:nvPicPr>
+          <p:cNvPr id="10" name="Picture 9">
+            <a:extLst>
+              <a:ext uri="{FF2B5EF4-FFF2-40B4-BE49-F238E27FC236}">
+                <a16:creationId xmlns:a16="http://schemas.microsoft.com/office/drawing/2014/main" id="{EEAD2215-6311-4D1C-B6B5-F57CB6BFCBCA}"/>
+              </a:ext>
+              <a:ext uri="{C183D7F6-B498-43B3-948B-1728B52AA6E4}">
+                <adec:decorative xmlns:adec="http://schemas.microsoft.com/office/drawing/2017/decorative" val="1"/>
+              </a:ext>
+            </a:extLst>
+          </p:cNvPr>
+          <p:cNvPicPr>
+            <a:picLocks noGrp="1" noRot="1" noChangeAspect="1" noMove="1" noResize="1" noEditPoints="1" noAdjustHandles="1" noChangeArrowheads="1" noChangeShapeType="1" noCrop="1"/>
+          </p:cNvPicPr>
+          <p:nvPr>
+            <p:extLst>
+              <p:ext uri="{386F3935-93C4-4BCD-93E2-E3B085C9AB24}">
+                <p16:designElem xmlns:p16="http://schemas.microsoft.com/office/powerpoint/2015/main" val="1"/>
+              </p:ext>
+            </p:extLst>
+          </p:nvPr>
+        </p:nvPicPr>
+        <p:blipFill>
+          <a:blip r:embed="rId4">
+            <a:extLst>
+              <a:ext uri="{28A0092B-C50C-407E-A947-70E740481C1C}">
+                <a14:useLocalDpi xmlns:a14="http://schemas.microsoft.com/office/drawing/2010/main" val="0"/>
+              </a:ext>
+            </a:extLst>
+          </a:blip>
+          <a:stretch>
+            <a:fillRect/>
+          </a:stretch>
+        </p:blipFill>
+        <p:spPr>
+          <a:xfrm>
+            <a:off x="0" y="0"/>
+            <a:ext cx="12189867" cy="6858000"/>
+          </a:xfrm>
+          <a:prstGeom prst="rect">
+            <a:avLst/>
+          </a:prstGeom>
+        </p:spPr>
+      </p:pic>
+      <p:sp>
+        <p:nvSpPr>
+          <p:cNvPr id="12" name="Rectangle 11">
+            <a:extLst>
+              <a:ext uri="{FF2B5EF4-FFF2-40B4-BE49-F238E27FC236}">
+                <a16:creationId xmlns:a16="http://schemas.microsoft.com/office/drawing/2014/main" id="{7BA5DE79-30D1-4A10-8DB9-0A6E523A9723}"/>
+              </a:ext>
+              <a:ext uri="{C183D7F6-B498-43B3-948B-1728B52AA6E4}">
+                <adec:decorative xmlns:adec="http://schemas.microsoft.com/office/drawing/2017/decorative" val="1"/>
+              </a:ext>
+            </a:extLst>
+          </p:cNvPr>
+          <p:cNvSpPr>
+            <a:spLocks noGrp="1" noRot="1" noChangeAspect="1" noMove="1" noResize="1" noEditPoints="1" noAdjustHandles="1" noChangeArrowheads="1" noChangeShapeType="1" noTextEdit="1"/>
+          </p:cNvSpPr>
+          <p:nvPr>
+            <p:extLst>
+              <p:ext uri="{386F3935-93C4-4BCD-93E2-E3B085C9AB24}">
+                <p16:designElem xmlns:p16="http://schemas.microsoft.com/office/powerpoint/2015/main" val="1"/>
+              </p:ext>
+            </p:extLst>
+          </p:nvPr>
+        </p:nvSpPr>
+        <p:spPr>
+          <a:xfrm>
+            <a:off x="0" y="0"/>
+            <a:ext cx="964174" cy="6858000"/>
+          </a:xfrm>
+          <a:prstGeom prst="rect">
+            <a:avLst/>
+          </a:prstGeom>
+          <a:solidFill>
+            <a:schemeClr val="bg2"/>
+          </a:solidFill>
+          <a:ln>
+            <a:noFill/>
+          </a:ln>
+        </p:spPr>
+        <p:style>
+          <a:lnRef idx="2">
+            <a:schemeClr val="accent1">
+              <a:shade val="50000"/>
+            </a:schemeClr>
+          </a:lnRef>
+          <a:fillRef idx="1">
+            <a:schemeClr val="accent1"/>
+          </a:fillRef>
+          <a:effectRef idx="0">
+            <a:schemeClr val="accent1"/>
+          </a:effectRef>
+          <a:fontRef idx="minor">
+            <a:schemeClr val="lt1"/>
+          </a:fontRef>
+        </p:style>
+      </p:sp>
+      <p:sp>
+        <p:nvSpPr>
+          <p:cNvPr id="14" name="Rectangle 13">
+            <a:extLst>
+              <a:ext uri="{FF2B5EF4-FFF2-40B4-BE49-F238E27FC236}">
+                <a16:creationId xmlns:a16="http://schemas.microsoft.com/office/drawing/2014/main" id="{9ABD0D63-D23F-4AE7-8270-4185EF9C1C25}"/>
+              </a:ext>
+              <a:ext uri="{C183D7F6-B498-43B3-948B-1728B52AA6E4}">
+                <adec:decorative xmlns:adec="http://schemas.microsoft.com/office/drawing/2017/decorative" val="1"/>
+              </a:ext>
+            </a:extLst>
+          </p:cNvPr>
+          <p:cNvSpPr>
+            <a:spLocks noGrp="1" noRot="1" noChangeAspect="1" noMove="1" noResize="1" noEditPoints="1" noAdjustHandles="1" noChangeArrowheads="1" noChangeShapeType="1" noTextEdit="1"/>
+          </p:cNvSpPr>
+          <p:nvPr>
+            <p:extLst>
+              <p:ext uri="{386F3935-93C4-4BCD-93E2-E3B085C9AB24}">
+                <p16:designElem xmlns:p16="http://schemas.microsoft.com/office/powerpoint/2015/main" val="1"/>
+              </p:ext>
+            </p:extLst>
+          </p:nvPr>
+        </p:nvSpPr>
+        <p:spPr>
+          <a:xfrm>
+            <a:off x="962042" y="0"/>
+            <a:ext cx="45719" cy="6858000"/>
+          </a:xfrm>
+          <a:prstGeom prst="rect">
+            <a:avLst/>
+          </a:prstGeom>
+          <a:solidFill>
+            <a:schemeClr val="accent6"/>
+          </a:solidFill>
+          <a:ln>
+            <a:noFill/>
+          </a:ln>
+        </p:spPr>
+        <p:style>
+          <a:lnRef idx="2">
+            <a:schemeClr val="accent1">
+              <a:shade val="50000"/>
+            </a:schemeClr>
+          </a:lnRef>
+          <a:fillRef idx="1">
+            <a:schemeClr val="accent1"/>
+          </a:fillRef>
+          <a:effectRef idx="0">
+            <a:schemeClr val="accent1"/>
+          </a:effectRef>
+          <a:fontRef idx="minor">
+            <a:schemeClr val="lt1"/>
+          </a:fontRef>
+        </p:style>
+      </p:sp>
+      <p:sp>
+        <p:nvSpPr>
+          <p:cNvPr id="16" name="Rectangle 15">
+            <a:extLst>
+              <a:ext uri="{FF2B5EF4-FFF2-40B4-BE49-F238E27FC236}">
+                <a16:creationId xmlns:a16="http://schemas.microsoft.com/office/drawing/2014/main" id="{72168E9E-94E9-4BE3-B88C-C8A468117753}"/>
+              </a:ext>
+              <a:ext uri="{C183D7F6-B498-43B3-948B-1728B52AA6E4}">
+                <adec:decorative xmlns:adec="http://schemas.microsoft.com/office/drawing/2017/decorative" val="1"/>
+              </a:ext>
+            </a:extLst>
+          </p:cNvPr>
+          <p:cNvSpPr>
+            <a:spLocks noGrp="1" noRot="1" noChangeAspect="1" noMove="1" noResize="1" noEditPoints="1" noAdjustHandles="1" noChangeArrowheads="1" noChangeShapeType="1" noTextEdit="1"/>
+          </p:cNvSpPr>
+          <p:nvPr>
+            <p:extLst>
+              <p:ext uri="{386F3935-93C4-4BCD-93E2-E3B085C9AB24}">
+                <p16:designElem xmlns:p16="http://schemas.microsoft.com/office/powerpoint/2015/main" val="1"/>
+              </p:ext>
+            </p:extLst>
+          </p:nvPr>
+        </p:nvSpPr>
+        <p:spPr>
+          <a:xfrm>
+            <a:off x="1007533" y="0"/>
+            <a:ext cx="7934348" cy="6858000"/>
+          </a:xfrm>
+          <a:prstGeom prst="rect">
+            <a:avLst/>
+          </a:prstGeom>
+          <a:solidFill>
+            <a:schemeClr val="bg2">
+              <a:alpha val="92000"/>
+            </a:schemeClr>
+          </a:solidFill>
+          <a:ln>
+            <a:noFill/>
+          </a:ln>
+        </p:spPr>
+        <p:style>
+          <a:lnRef idx="2">
+            <a:schemeClr val="accent1">
+              <a:shade val="50000"/>
+            </a:schemeClr>
+          </a:lnRef>
+          <a:fillRef idx="1">
+            <a:schemeClr val="accent1"/>
+          </a:fillRef>
+          <a:effectRef idx="0">
+            <a:schemeClr val="accent1"/>
+          </a:effectRef>
+          <a:fontRef idx="minor">
+            <a:schemeClr val="lt1"/>
+          </a:fontRef>
+        </p:style>
+      </p:sp>
+      <p:sp>
+        <p:nvSpPr>
+          <p:cNvPr id="18" name="Rectangle 17">
+            <a:extLst>
+              <a:ext uri="{FF2B5EF4-FFF2-40B4-BE49-F238E27FC236}">
+                <a16:creationId xmlns:a16="http://schemas.microsoft.com/office/drawing/2014/main" id="{12107AC1-AA0D-4097-B03D-FD3C632AB886}"/>
+              </a:ext>
+              <a:ext uri="{C183D7F6-B498-43B3-948B-1728B52AA6E4}">
+                <adec:decorative xmlns:adec="http://schemas.microsoft.com/office/drawing/2017/decorative" val="1"/>
+              </a:ext>
+            </a:extLst>
+          </p:cNvPr>
+          <p:cNvSpPr>
+            <a:spLocks noGrp="1" noRot="1" noChangeAspect="1" noMove="1" noResize="1" noEditPoints="1" noAdjustHandles="1" noChangeArrowheads="1" noChangeShapeType="1" noTextEdit="1"/>
+          </p:cNvSpPr>
+          <p:nvPr>
+            <p:extLst>
+              <p:ext uri="{386F3935-93C4-4BCD-93E2-E3B085C9AB24}">
+                <p16:designElem xmlns:p16="http://schemas.microsoft.com/office/powerpoint/2015/main" val="1"/>
+              </p:ext>
+            </p:extLst>
+          </p:nvPr>
+        </p:nvSpPr>
+        <p:spPr>
+          <a:xfrm>
+            <a:off x="8941881" y="0"/>
+            <a:ext cx="27432" cy="6858000"/>
+          </a:xfrm>
+          <a:prstGeom prst="rect">
+            <a:avLst/>
+          </a:prstGeom>
+          <a:solidFill>
+            <a:schemeClr val="accent6"/>
+          </a:solidFill>
+          <a:ln>
+            <a:noFill/>
+          </a:ln>
+        </p:spPr>
+        <p:style>
+          <a:lnRef idx="2">
+            <a:schemeClr val="accent1">
+              <a:shade val="50000"/>
+            </a:schemeClr>
+          </a:lnRef>
+          <a:fillRef idx="1">
+            <a:schemeClr val="accent1"/>
+          </a:fillRef>
+          <a:effectRef idx="0">
+            <a:schemeClr val="accent1"/>
+          </a:effectRef>
+          <a:fontRef idx="minor">
+            <a:schemeClr val="lt1"/>
+          </a:fontRef>
+        </p:style>
+      </p:sp>
+      <p:sp>
+        <p:nvSpPr>
+          <p:cNvPr id="20" name="TextBox 19">
+            <a:extLst>
+              <a:ext uri="{FF2B5EF4-FFF2-40B4-BE49-F238E27FC236}">
+                <a16:creationId xmlns:a16="http://schemas.microsoft.com/office/drawing/2014/main" id="{7C8D231A-EC46-4736-B00F-76D307082204}"/>
+              </a:ext>
+              <a:ext uri="{C183D7F6-B498-43B3-948B-1728B52AA6E4}">
+                <adec:decorative xmlns:adec="http://schemas.microsoft.com/office/drawing/2017/decorative" val="1"/>
+              </a:ext>
+            </a:extLst>
+          </p:cNvPr>
+          <p:cNvSpPr txBox="1">
+            <a:spLocks noGrp="1" noRot="1" noChangeAspect="1" noMove="1" noResize="1" noEditPoints="1" noAdjustHandles="1" noChangeArrowheads="1" noChangeShapeType="1" noTextEdit="1"/>
+          </p:cNvSpPr>
+          <p:nvPr>
+            <p:extLst>
+              <p:ext uri="{386F3935-93C4-4BCD-93E2-E3B085C9AB24}">
+                <p16:designElem xmlns:p16="http://schemas.microsoft.com/office/powerpoint/2015/main" val="1"/>
+              </p:ext>
+            </p:extLst>
+          </p:nvPr>
+        </p:nvSpPr>
+        <p:spPr>
+          <a:xfrm>
+            <a:off x="2191282" y="3262852"/>
+            <a:ext cx="415636" cy="461665"/>
+          </a:xfrm>
+          <a:prstGeom prst="rect">
+            <a:avLst/>
+          </a:prstGeom>
+          <a:noFill/>
+        </p:spPr>
+        <p:txBody>
+          <a:bodyPr wrap="square" rtlCol="0">
+            <a:spAutoFit/>
+          </a:bodyPr>
+          <a:lstStyle/>
+          <a:p>
+            <a:pPr algn="r">
+              <a:spcAft>
+                <a:spcPts val="600"/>
+              </a:spcAft>
+            </a:pPr>
+            <a:r>
+              <a:rPr lang="en-US" sz="2400" dirty="0">
+                <a:solidFill>
+                  <a:schemeClr val="accent6"/>
+                </a:solidFill>
+                <a:latin typeface="Wingdings 3" panose="05040102010807070707" pitchFamily="18" charset="2"/>
+              </a:rPr>
+              <a:t>z</a:t>
+            </a:r>
+            <a:endParaRPr lang="en-US" sz="2400" dirty="0">
+              <a:solidFill>
+                <a:schemeClr val="accent6"/>
+              </a:solidFill>
+              <a:latin typeface="MS Shell Dlg 2" panose="020B0604030504040204" pitchFamily="34" charset="0"/>
+            </a:endParaRPr>
+          </a:p>
+        </p:txBody>
+      </p:sp>
+      <p:sp useBgFill="1">
+        <p:nvSpPr>
+          <p:cNvPr id="22" name="Rectangle 21">
+            <a:extLst>
+              <a:ext uri="{FF2B5EF4-FFF2-40B4-BE49-F238E27FC236}">
+                <a16:creationId xmlns:a16="http://schemas.microsoft.com/office/drawing/2014/main" id="{8F3CF990-ACB8-443A-BB74-D36EC8A00B02}"/>
+              </a:ext>
+              <a:ext uri="{C183D7F6-B498-43B3-948B-1728B52AA6E4}">
+                <adec:decorative xmlns:adec="http://schemas.microsoft.com/office/drawing/2017/decorative" val="1"/>
+              </a:ext>
+            </a:extLst>
+          </p:cNvPr>
+          <p:cNvSpPr>
+            <a:spLocks noGrp="1" noRot="1" noChangeAspect="1" noMove="1" noResize="1" noEditPoints="1" noAdjustHandles="1" noChangeArrowheads="1" noChangeShapeType="1" noTextEdit="1"/>
+          </p:cNvSpPr>
+          <p:nvPr>
+            <p:extLst>
+              <p:ext uri="{386F3935-93C4-4BCD-93E2-E3B085C9AB24}">
+                <p16:designElem xmlns:p16="http://schemas.microsoft.com/office/powerpoint/2015/main" val="1"/>
+              </p:ext>
+            </p:extLst>
+          </p:nvPr>
+        </p:nvSpPr>
+        <p:spPr>
+          <a:xfrm>
+            <a:off x="0" y="-1"/>
+            <a:ext cx="12192000" cy="6858001"/>
+          </a:xfrm>
+          <a:prstGeom prst="rect">
+            <a:avLst/>
+          </a:prstGeom>
+          <a:ln>
+            <a:noFill/>
+          </a:ln>
+        </p:spPr>
+        <p:style>
+          <a:lnRef idx="2">
+            <a:schemeClr val="accent1">
+              <a:shade val="50000"/>
+            </a:schemeClr>
+          </a:lnRef>
+          <a:fillRef idx="1">
+            <a:schemeClr val="accent1"/>
+          </a:fillRef>
+          <a:effectRef idx="0">
+            <a:schemeClr val="accent1"/>
+          </a:effectRef>
+          <a:fontRef idx="minor">
+            <a:schemeClr val="lt1"/>
+          </a:fontRef>
+        </p:style>
+        <p:txBody>
+          <a:bodyPr rtlCol="0" anchor="ctr"/>
+          <a:lstStyle/>
+          <a:p>
+            <a:pPr algn="ctr"/>
+            <a:endParaRPr lang="en-US"/>
+          </a:p>
+        </p:txBody>
+      </p:sp>
+      <p:pic>
+        <p:nvPicPr>
+          <p:cNvPr id="24" name="Picture 23">
+            <a:extLst>
+              <a:ext uri="{FF2B5EF4-FFF2-40B4-BE49-F238E27FC236}">
+                <a16:creationId xmlns:a16="http://schemas.microsoft.com/office/drawing/2014/main" id="{00B98862-BEE1-44FB-A335-A1B9106B445E}"/>
+              </a:ext>
+              <a:ext uri="{C183D7F6-B498-43B3-948B-1728B52AA6E4}">
+                <adec:decorative xmlns:adec="http://schemas.microsoft.com/office/drawing/2017/decorative" val="1"/>
+              </a:ext>
+            </a:extLst>
+          </p:cNvPr>
+          <p:cNvPicPr>
+            <a:picLocks noGrp="1" noRot="1" noChangeAspect="1" noMove="1" noResize="1" noEditPoints="1" noAdjustHandles="1" noChangeArrowheads="1" noChangeShapeType="1" noCrop="1"/>
+          </p:cNvPicPr>
+          <p:nvPr>
+            <p:extLst>
+              <p:ext uri="{386F3935-93C4-4BCD-93E2-E3B085C9AB24}">
+                <p16:designElem xmlns:p16="http://schemas.microsoft.com/office/powerpoint/2015/main" val="1"/>
+              </p:ext>
+            </p:extLst>
+          </p:nvPr>
+        </p:nvPicPr>
+        <p:blipFill>
+          <a:blip r:embed="rId3">
+            <a:extLst>
+              <a:ext uri="{28A0092B-C50C-407E-A947-70E740481C1C}">
+                <a14:useLocalDpi xmlns:a14="http://schemas.microsoft.com/office/drawing/2010/main" val="0"/>
+              </a:ext>
+            </a:extLst>
+          </a:blip>
+          <a:stretch>
+            <a:fillRect/>
+          </a:stretch>
+        </p:blipFill>
+        <p:spPr>
+          <a:xfrm>
+            <a:off x="2831794" y="2105202"/>
+            <a:ext cx="9360205" cy="4752798"/>
+          </a:xfrm>
+          <a:prstGeom prst="rect">
+            <a:avLst/>
+          </a:prstGeom>
+          <a:noFill/>
+        </p:spPr>
+      </p:pic>
+      <p:sp>
+        <p:nvSpPr>
+          <p:cNvPr id="26" name="Freeform: Shape 25">
+            <a:extLst>
+              <a:ext uri="{FF2B5EF4-FFF2-40B4-BE49-F238E27FC236}">
+                <a16:creationId xmlns:a16="http://schemas.microsoft.com/office/drawing/2014/main" id="{65F94F98-3A57-49AA-838E-91AAF600B6EE}"/>
+              </a:ext>
+              <a:ext uri="{C183D7F6-B498-43B3-948B-1728B52AA6E4}">
+                <adec:decorative xmlns:adec="http://schemas.microsoft.com/office/drawing/2017/decorative" val="1"/>
+              </a:ext>
+            </a:extLst>
+          </p:cNvPr>
+          <p:cNvSpPr>
+            <a:spLocks noGrp="1" noRot="1" noChangeAspect="1" noMove="1" noResize="1" noEditPoints="1" noAdjustHandles="1" noChangeArrowheads="1" noChangeShapeType="1" noTextEdit="1"/>
+          </p:cNvSpPr>
+          <p:nvPr>
+            <p:extLst>
+              <p:ext uri="{386F3935-93C4-4BCD-93E2-E3B085C9AB24}">
+                <p16:designElem xmlns:p16="http://schemas.microsoft.com/office/powerpoint/2015/main" val="1"/>
+              </p:ext>
+            </p:extLst>
+          </p:nvPr>
+        </p:nvSpPr>
+        <p:spPr>
+          <a:xfrm rot="16200000">
+            <a:off x="3678519" y="-1660968"/>
+            <a:ext cx="5838229" cy="11188733"/>
+          </a:xfrm>
+          <a:custGeom>
+            <a:avLst/>
+            <a:gdLst>
+              <a:gd name="connsiteX0" fmla="*/ 0 w 7821919"/>
+              <a:gd name="connsiteY0" fmla="*/ 0 h 6858000"/>
+              <a:gd name="connsiteX1" fmla="*/ 6983367 w 7821919"/>
+              <a:gd name="connsiteY1" fmla="*/ 0 h 6858000"/>
+              <a:gd name="connsiteX2" fmla="*/ 6982269 w 7821919"/>
+              <a:gd name="connsiteY2" fmla="*/ 1331 h 6858000"/>
+              <a:gd name="connsiteX3" fmla="*/ 6833782 w 7821919"/>
+              <a:gd name="connsiteY3" fmla="*/ 487443 h 6858000"/>
+              <a:gd name="connsiteX4" fmla="*/ 6851446 w 7821919"/>
+              <a:gd name="connsiteY4" fmla="*/ 662666 h 6858000"/>
+              <a:gd name="connsiteX5" fmla="*/ 6857532 w 7821919"/>
+              <a:gd name="connsiteY5" fmla="*/ 686333 h 6858000"/>
+              <a:gd name="connsiteX6" fmla="*/ 6806927 w 7821919"/>
+              <a:gd name="connsiteY6" fmla="*/ 699345 h 6858000"/>
+              <a:gd name="connsiteX7" fmla="*/ 5555365 w 7821919"/>
+              <a:gd name="connsiteY7" fmla="*/ 2400515 h 6858000"/>
+              <a:gd name="connsiteX8" fmla="*/ 7336617 w 7821919"/>
+              <a:gd name="connsiteY8" fmla="*/ 4181767 h 6858000"/>
+              <a:gd name="connsiteX9" fmla="*/ 7452815 w 7821919"/>
+              <a:gd name="connsiteY9" fmla="*/ 4175900 h 6858000"/>
+              <a:gd name="connsiteX10" fmla="*/ 7437456 w 7821919"/>
+              <a:gd name="connsiteY10" fmla="*/ 4225378 h 6858000"/>
+              <a:gd name="connsiteX11" fmla="*/ 7428275 w 7821919"/>
+              <a:gd name="connsiteY11" fmla="*/ 4316448 h 6858000"/>
+              <a:gd name="connsiteX12" fmla="*/ 7789089 w 7821919"/>
+              <a:gd name="connsiteY12" fmla="*/ 4759152 h 6858000"/>
+              <a:gd name="connsiteX13" fmla="*/ 7821919 w 7821919"/>
+              <a:gd name="connsiteY13" fmla="*/ 4762461 h 6858000"/>
+              <a:gd name="connsiteX14" fmla="*/ 7809638 w 7821919"/>
+              <a:gd name="connsiteY14" fmla="*/ 4785088 h 6858000"/>
+              <a:gd name="connsiteX15" fmla="*/ 7794661 w 7821919"/>
+              <a:gd name="connsiteY15" fmla="*/ 4833335 h 6858000"/>
+              <a:gd name="connsiteX16" fmla="*/ 7524776 w 7821919"/>
+              <a:gd name="connsiteY16" fmla="*/ 4917113 h 6858000"/>
+              <a:gd name="connsiteX17" fmla="*/ 6642110 w 7821919"/>
+              <a:gd name="connsiteY17" fmla="*/ 6248746 h 6858000"/>
+              <a:gd name="connsiteX18" fmla="*/ 6755682 w 7821919"/>
+              <a:gd name="connsiteY18" fmla="*/ 6811285 h 6858000"/>
+              <a:gd name="connsiteX19" fmla="*/ 6778185 w 7821919"/>
+              <a:gd name="connsiteY19" fmla="*/ 6858000 h 6858000"/>
+              <a:gd name="connsiteX20" fmla="*/ 0 w 7821919"/>
+              <a:gd name="connsiteY20" fmla="*/ 6858000 h 6858000"/>
+            </a:gdLst>
+            <a:ahLst/>
+            <a:cxnLst>
+              <a:cxn ang="0">
+                <a:pos x="connsiteX0" y="connsiteY0"/>
+              </a:cxn>
+              <a:cxn ang="0">
+                <a:pos x="connsiteX1" y="connsiteY1"/>
+              </a:cxn>
+              <a:cxn ang="0">
+                <a:pos x="connsiteX2" y="connsiteY2"/>
+              </a:cxn>
+              <a:cxn ang="0">
+                <a:pos x="connsiteX3" y="connsiteY3"/>
+              </a:cxn>
+              <a:cxn ang="0">
+                <a:pos x="connsiteX4" y="connsiteY4"/>
+              </a:cxn>
+              <a:cxn ang="0">
+                <a:pos x="connsiteX5" y="connsiteY5"/>
+              </a:cxn>
+              <a:cxn ang="0">
+                <a:pos x="connsiteX6" y="connsiteY6"/>
+              </a:cxn>
+              <a:cxn ang="0">
+                <a:pos x="connsiteX7" y="connsiteY7"/>
+              </a:cxn>
+              <a:cxn ang="0">
+                <a:pos x="connsiteX8" y="connsiteY8"/>
+              </a:cxn>
+              <a:cxn ang="0">
+                <a:pos x="connsiteX9" y="connsiteY9"/>
+              </a:cxn>
+              <a:cxn ang="0">
+                <a:pos x="connsiteX10" y="connsiteY10"/>
+              </a:cxn>
+              <a:cxn ang="0">
+                <a:pos x="connsiteX11" y="connsiteY11"/>
+              </a:cxn>
+              <a:cxn ang="0">
+                <a:pos x="connsiteX12" y="connsiteY12"/>
+              </a:cxn>
+              <a:cxn ang="0">
+                <a:pos x="connsiteX13" y="connsiteY13"/>
+              </a:cxn>
+              <a:cxn ang="0">
+                <a:pos x="connsiteX14" y="connsiteY14"/>
+              </a:cxn>
+              <a:cxn ang="0">
+                <a:pos x="connsiteX15" y="connsiteY15"/>
+              </a:cxn>
+              <a:cxn ang="0">
+                <a:pos x="connsiteX16" y="connsiteY16"/>
+              </a:cxn>
+              <a:cxn ang="0">
+                <a:pos x="connsiteX17" y="connsiteY17"/>
+              </a:cxn>
+              <a:cxn ang="0">
+                <a:pos x="connsiteX18" y="connsiteY18"/>
+              </a:cxn>
+              <a:cxn ang="0">
+                <a:pos x="connsiteX19" y="connsiteY19"/>
+              </a:cxn>
+              <a:cxn ang="0">
+                <a:pos x="connsiteX20" y="connsiteY20"/>
+              </a:cxn>
+            </a:cxnLst>
+            <a:rect l="l" t="t" r="r" b="b"/>
+            <a:pathLst>
+              <a:path w="7821919" h="6858000">
+                <a:moveTo>
+                  <a:pt x="0" y="0"/>
+                </a:moveTo>
+                <a:lnTo>
+                  <a:pt x="6983367" y="0"/>
+                </a:lnTo>
+                <a:lnTo>
+                  <a:pt x="6982269" y="1331"/>
+                </a:lnTo>
+                <a:cubicBezTo>
+                  <a:pt x="6888522" y="140095"/>
+                  <a:pt x="6833782" y="307376"/>
+                  <a:pt x="6833782" y="487443"/>
+                </a:cubicBezTo>
+                <a:cubicBezTo>
+                  <a:pt x="6833782" y="547466"/>
+                  <a:pt x="6839864" y="606067"/>
+                  <a:pt x="6851446" y="662666"/>
+                </a:cubicBezTo>
+                <a:lnTo>
+                  <a:pt x="6857532" y="686333"/>
+                </a:lnTo>
+                <a:lnTo>
+                  <a:pt x="6806927" y="699345"/>
+                </a:lnTo>
+                <a:cubicBezTo>
+                  <a:pt x="6081835" y="924872"/>
+                  <a:pt x="5555365" y="1601212"/>
+                  <a:pt x="5555365" y="2400515"/>
+                </a:cubicBezTo>
+                <a:cubicBezTo>
+                  <a:pt x="5555365" y="3384273"/>
+                  <a:pt x="6352859" y="4181767"/>
+                  <a:pt x="7336617" y="4181767"/>
+                </a:cubicBezTo>
+                <a:lnTo>
+                  <a:pt x="7452815" y="4175900"/>
+                </a:lnTo>
+                <a:lnTo>
+                  <a:pt x="7437456" y="4225378"/>
+                </a:lnTo>
+                <a:cubicBezTo>
+                  <a:pt x="7431436" y="4254794"/>
+                  <a:pt x="7428275" y="4285252"/>
+                  <a:pt x="7428275" y="4316448"/>
+                </a:cubicBezTo>
+                <a:cubicBezTo>
+                  <a:pt x="7428275" y="4534821"/>
+                  <a:pt x="7583172" y="4717015"/>
+                  <a:pt x="7789089" y="4759152"/>
+                </a:cubicBezTo>
+                <a:lnTo>
+                  <a:pt x="7821919" y="4762461"/>
+                </a:lnTo>
+                <a:lnTo>
+                  <a:pt x="7809638" y="4785088"/>
+                </a:lnTo>
+                <a:lnTo>
+                  <a:pt x="7794661" y="4833335"/>
+                </a:lnTo>
+                <a:lnTo>
+                  <a:pt x="7524776" y="4917113"/>
+                </a:lnTo>
+                <a:cubicBezTo>
+                  <a:pt x="7006070" y="5136507"/>
+                  <a:pt x="6642110" y="5650122"/>
+                  <a:pt x="6642110" y="6248746"/>
+                </a:cubicBezTo>
+                <a:cubicBezTo>
+                  <a:pt x="6642110" y="6448287"/>
+                  <a:pt x="6682550" y="6638383"/>
+                  <a:pt x="6755682" y="6811285"/>
+                </a:cubicBezTo>
+                <a:lnTo>
+                  <a:pt x="6778185" y="6858000"/>
+                </a:lnTo>
+                <a:lnTo>
+                  <a:pt x="0" y="6858000"/>
+                </a:lnTo>
+                <a:close/>
+              </a:path>
+            </a:pathLst>
+          </a:custGeom>
+          <a:gradFill>
+            <a:gsLst>
+              <a:gs pos="25000">
+                <a:schemeClr val="accent1">
+                  <a:alpha val="0"/>
+                </a:schemeClr>
+              </a:gs>
+              <a:gs pos="100000">
+                <a:schemeClr val="accent1">
+                  <a:alpha val="75000"/>
+                </a:schemeClr>
+              </a:gs>
+            </a:gsLst>
+            <a:lin ang="10800000" scaled="1"/>
+          </a:gradFill>
+          <a:ln>
+            <a:noFill/>
+          </a:ln>
+        </p:spPr>
+        <p:style>
+          <a:lnRef idx="2">
+            <a:schemeClr val="accent1">
+              <a:shade val="50000"/>
+            </a:schemeClr>
+          </a:lnRef>
+          <a:fillRef idx="1">
+            <a:schemeClr val="accent1"/>
+          </a:fillRef>
+          <a:effectRef idx="0">
+            <a:schemeClr val="accent1"/>
+          </a:effectRef>
+          <a:fontRef idx="minor">
+            <a:schemeClr val="lt1"/>
+          </a:fontRef>
+        </p:style>
+      </p:sp>
+      <p:pic>
+        <p:nvPicPr>
+          <p:cNvPr id="28" name="Picture 27">
+            <a:extLst>
+              <a:ext uri="{FF2B5EF4-FFF2-40B4-BE49-F238E27FC236}">
+                <a16:creationId xmlns:a16="http://schemas.microsoft.com/office/drawing/2014/main" id="{7185CF21-0594-48C0-9F3E-254D6BCE9D9B}"/>
+              </a:ext>
+              <a:ext uri="{C183D7F6-B498-43B3-948B-1728B52AA6E4}">
+                <adec:decorative xmlns:adec="http://schemas.microsoft.com/office/drawing/2017/decorative" val="1"/>
+              </a:ext>
+            </a:extLst>
+          </p:cNvPr>
+          <p:cNvPicPr>
+            <a:picLocks noGrp="1" noRot="1" noChangeAspect="1" noMove="1" noResize="1" noEditPoints="1" noAdjustHandles="1" noChangeArrowheads="1" noChangeShapeType="1" noCrop="1"/>
+          </p:cNvPicPr>
+          <p:nvPr>
+            <p:extLst>
+              <p:ext uri="{386F3935-93C4-4BCD-93E2-E3B085C9AB24}">
+                <p16:designElem xmlns:p16="http://schemas.microsoft.com/office/powerpoint/2015/main" val="1"/>
+              </p:ext>
+            </p:extLst>
+          </p:nvPr>
+        </p:nvPicPr>
+        <p:blipFill>
+          <a:blip r:embed="rId4">
+            <a:extLst>
+              <a:ext uri="{28A0092B-C50C-407E-A947-70E740481C1C}">
+                <a14:useLocalDpi xmlns:a14="http://schemas.microsoft.com/office/drawing/2010/main" val="0"/>
+              </a:ext>
+            </a:extLst>
+          </a:blip>
+          <a:stretch>
+            <a:fillRect/>
+          </a:stretch>
+        </p:blipFill>
+        <p:spPr>
+          <a:xfrm>
+            <a:off x="45489" y="-5487"/>
+            <a:ext cx="12189867" cy="6858000"/>
+          </a:xfrm>
+          <a:prstGeom prst="rect">
+            <a:avLst/>
+          </a:prstGeom>
+        </p:spPr>
+      </p:pic>
+      <p:sp>
+        <p:nvSpPr>
+          <p:cNvPr id="30" name="Rectangle 29">
+            <a:extLst>
+              <a:ext uri="{FF2B5EF4-FFF2-40B4-BE49-F238E27FC236}">
+                <a16:creationId xmlns:a16="http://schemas.microsoft.com/office/drawing/2014/main" id="{A0B5529D-5CAA-4BF2-B5C9-34705E7661F9}"/>
+              </a:ext>
+              <a:ext uri="{C183D7F6-B498-43B3-948B-1728B52AA6E4}">
+                <adec:decorative xmlns:adec="http://schemas.microsoft.com/office/drawing/2017/decorative" val="1"/>
+              </a:ext>
+            </a:extLst>
+          </p:cNvPr>
+          <p:cNvSpPr>
+            <a:spLocks noGrp="1" noRot="1" noChangeAspect="1" noMove="1" noResize="1" noEditPoints="1" noAdjustHandles="1" noChangeArrowheads="1" noChangeShapeType="1" noTextEdit="1"/>
+          </p:cNvSpPr>
+          <p:nvPr>
+            <p:extLst>
+              <p:ext uri="{386F3935-93C4-4BCD-93E2-E3B085C9AB24}">
+                <p16:designElem xmlns:p16="http://schemas.microsoft.com/office/powerpoint/2015/main" val="1"/>
+              </p:ext>
+            </p:extLst>
+          </p:nvPr>
+        </p:nvSpPr>
+        <p:spPr>
+          <a:xfrm>
+            <a:off x="0" y="0"/>
+            <a:ext cx="959909" cy="6858000"/>
+          </a:xfrm>
+          <a:prstGeom prst="rect">
+            <a:avLst/>
+          </a:prstGeom>
+          <a:solidFill>
+            <a:schemeClr val="bg2">
+              <a:lumMod val="90000"/>
+              <a:lumOff val="10000"/>
+            </a:schemeClr>
+          </a:solidFill>
+          <a:ln>
+            <a:noFill/>
+          </a:ln>
+        </p:spPr>
+        <p:style>
+          <a:lnRef idx="2">
+            <a:schemeClr val="accent1">
+              <a:shade val="50000"/>
+            </a:schemeClr>
+          </a:lnRef>
+          <a:fillRef idx="1">
+            <a:schemeClr val="accent1"/>
+          </a:fillRef>
+          <a:effectRef idx="0">
+            <a:schemeClr val="accent1"/>
+          </a:effectRef>
+          <a:fontRef idx="minor">
+            <a:schemeClr val="lt1"/>
+          </a:fontRef>
+        </p:style>
+      </p:sp>
+      <p:sp>
+        <p:nvSpPr>
+          <p:cNvPr id="32" name="Freeform: Shape 31">
+            <a:extLst>
+              <a:ext uri="{FF2B5EF4-FFF2-40B4-BE49-F238E27FC236}">
+                <a16:creationId xmlns:a16="http://schemas.microsoft.com/office/drawing/2014/main" id="{FBD68200-BC03-4015-860B-CD5C30CD76B8}"/>
+              </a:ext>
+              <a:ext uri="{C183D7F6-B498-43B3-948B-1728B52AA6E4}">
+                <adec:decorative xmlns:adec="http://schemas.microsoft.com/office/drawing/2017/decorative" val="1"/>
+              </a:ext>
+            </a:extLst>
+          </p:cNvPr>
+          <p:cNvSpPr>
+            <a:spLocks noGrp="1" noRot="1" noChangeAspect="1" noMove="1" noResize="1" noEditPoints="1" noAdjustHandles="1" noChangeArrowheads="1" noChangeShapeType="1" noTextEdit="1"/>
+          </p:cNvSpPr>
+          <p:nvPr>
+            <p:extLst>
+              <p:ext uri="{386F3935-93C4-4BCD-93E2-E3B085C9AB24}">
+                <p16:designElem xmlns:p16="http://schemas.microsoft.com/office/powerpoint/2015/main" val="1"/>
+              </p:ext>
+            </p:extLst>
+          </p:nvPr>
+        </p:nvSpPr>
+        <p:spPr>
+          <a:xfrm>
+            <a:off x="959910" y="0"/>
+            <a:ext cx="7869544" cy="6858000"/>
+          </a:xfrm>
+          <a:custGeom>
+            <a:avLst/>
+            <a:gdLst>
+              <a:gd name="connsiteX0" fmla="*/ 0 w 7821919"/>
+              <a:gd name="connsiteY0" fmla="*/ 0 h 6858000"/>
+              <a:gd name="connsiteX1" fmla="*/ 6983367 w 7821919"/>
+              <a:gd name="connsiteY1" fmla="*/ 0 h 6858000"/>
+              <a:gd name="connsiteX2" fmla="*/ 6982269 w 7821919"/>
+              <a:gd name="connsiteY2" fmla="*/ 1331 h 6858000"/>
+              <a:gd name="connsiteX3" fmla="*/ 6833782 w 7821919"/>
+              <a:gd name="connsiteY3" fmla="*/ 487443 h 6858000"/>
+              <a:gd name="connsiteX4" fmla="*/ 6851446 w 7821919"/>
+              <a:gd name="connsiteY4" fmla="*/ 662666 h 6858000"/>
+              <a:gd name="connsiteX5" fmla="*/ 6857532 w 7821919"/>
+              <a:gd name="connsiteY5" fmla="*/ 686333 h 6858000"/>
+              <a:gd name="connsiteX6" fmla="*/ 6806927 w 7821919"/>
+              <a:gd name="connsiteY6" fmla="*/ 699345 h 6858000"/>
+              <a:gd name="connsiteX7" fmla="*/ 5555365 w 7821919"/>
+              <a:gd name="connsiteY7" fmla="*/ 2400515 h 6858000"/>
+              <a:gd name="connsiteX8" fmla="*/ 7336617 w 7821919"/>
+              <a:gd name="connsiteY8" fmla="*/ 4181767 h 6858000"/>
+              <a:gd name="connsiteX9" fmla="*/ 7452815 w 7821919"/>
+              <a:gd name="connsiteY9" fmla="*/ 4175900 h 6858000"/>
+              <a:gd name="connsiteX10" fmla="*/ 7437456 w 7821919"/>
+              <a:gd name="connsiteY10" fmla="*/ 4225378 h 6858000"/>
+              <a:gd name="connsiteX11" fmla="*/ 7428275 w 7821919"/>
+              <a:gd name="connsiteY11" fmla="*/ 4316448 h 6858000"/>
+              <a:gd name="connsiteX12" fmla="*/ 7789089 w 7821919"/>
+              <a:gd name="connsiteY12" fmla="*/ 4759152 h 6858000"/>
+              <a:gd name="connsiteX13" fmla="*/ 7821919 w 7821919"/>
+              <a:gd name="connsiteY13" fmla="*/ 4762461 h 6858000"/>
+              <a:gd name="connsiteX14" fmla="*/ 7809638 w 7821919"/>
+              <a:gd name="connsiteY14" fmla="*/ 4785088 h 6858000"/>
+              <a:gd name="connsiteX15" fmla="*/ 7794661 w 7821919"/>
+              <a:gd name="connsiteY15" fmla="*/ 4833335 h 6858000"/>
+              <a:gd name="connsiteX16" fmla="*/ 7524776 w 7821919"/>
+              <a:gd name="connsiteY16" fmla="*/ 4917113 h 6858000"/>
+              <a:gd name="connsiteX17" fmla="*/ 6642110 w 7821919"/>
+              <a:gd name="connsiteY17" fmla="*/ 6248746 h 6858000"/>
+              <a:gd name="connsiteX18" fmla="*/ 6755682 w 7821919"/>
+              <a:gd name="connsiteY18" fmla="*/ 6811285 h 6858000"/>
+              <a:gd name="connsiteX19" fmla="*/ 6778185 w 7821919"/>
+              <a:gd name="connsiteY19" fmla="*/ 6858000 h 6858000"/>
+              <a:gd name="connsiteX20" fmla="*/ 0 w 7821919"/>
+              <a:gd name="connsiteY20" fmla="*/ 6858000 h 6858000"/>
+            </a:gdLst>
+            <a:ahLst/>
+            <a:cxnLst>
+              <a:cxn ang="0">
+                <a:pos x="connsiteX0" y="connsiteY0"/>
+              </a:cxn>
+              <a:cxn ang="0">
+                <a:pos x="connsiteX1" y="connsiteY1"/>
+              </a:cxn>
+              <a:cxn ang="0">
+                <a:pos x="connsiteX2" y="connsiteY2"/>
+              </a:cxn>
+              <a:cxn ang="0">
+                <a:pos x="connsiteX3" y="connsiteY3"/>
+              </a:cxn>
+              <a:cxn ang="0">
+                <a:pos x="connsiteX4" y="connsiteY4"/>
+              </a:cxn>
+              <a:cxn ang="0">
+                <a:pos x="connsiteX5" y="connsiteY5"/>
+              </a:cxn>
+              <a:cxn ang="0">
+                <a:pos x="connsiteX6" y="connsiteY6"/>
+              </a:cxn>
+              <a:cxn ang="0">
+                <a:pos x="connsiteX7" y="connsiteY7"/>
+              </a:cxn>
+              <a:cxn ang="0">
+                <a:pos x="connsiteX8" y="connsiteY8"/>
+              </a:cxn>
+              <a:cxn ang="0">
+                <a:pos x="connsiteX9" y="connsiteY9"/>
+              </a:cxn>
+              <a:cxn ang="0">
+                <a:pos x="connsiteX10" y="connsiteY10"/>
+              </a:cxn>
+              <a:cxn ang="0">
+                <a:pos x="connsiteX11" y="connsiteY11"/>
+              </a:cxn>
+              <a:cxn ang="0">
+                <a:pos x="connsiteX12" y="connsiteY12"/>
+              </a:cxn>
+              <a:cxn ang="0">
+                <a:pos x="connsiteX13" y="connsiteY13"/>
+              </a:cxn>
+              <a:cxn ang="0">
+                <a:pos x="connsiteX14" y="connsiteY14"/>
+              </a:cxn>
+              <a:cxn ang="0">
+                <a:pos x="connsiteX15" y="connsiteY15"/>
+              </a:cxn>
+              <a:cxn ang="0">
+                <a:pos x="connsiteX16" y="connsiteY16"/>
+              </a:cxn>
+              <a:cxn ang="0">
+                <a:pos x="connsiteX17" y="connsiteY17"/>
+              </a:cxn>
+              <a:cxn ang="0">
+                <a:pos x="connsiteX18" y="connsiteY18"/>
+              </a:cxn>
+              <a:cxn ang="0">
+                <a:pos x="connsiteX19" y="connsiteY19"/>
+              </a:cxn>
+              <a:cxn ang="0">
+                <a:pos x="connsiteX20" y="connsiteY20"/>
+              </a:cxn>
+            </a:cxnLst>
+            <a:rect l="l" t="t" r="r" b="b"/>
+            <a:pathLst>
+              <a:path w="7821919" h="6858000">
+                <a:moveTo>
+                  <a:pt x="0" y="0"/>
+                </a:moveTo>
+                <a:lnTo>
+                  <a:pt x="6983367" y="0"/>
+                </a:lnTo>
+                <a:lnTo>
+                  <a:pt x="6982269" y="1331"/>
+                </a:lnTo>
+                <a:cubicBezTo>
+                  <a:pt x="6888522" y="140095"/>
+                  <a:pt x="6833782" y="307376"/>
+                  <a:pt x="6833782" y="487443"/>
+                </a:cubicBezTo>
+                <a:cubicBezTo>
+                  <a:pt x="6833782" y="547466"/>
+                  <a:pt x="6839864" y="606067"/>
+                  <a:pt x="6851446" y="662666"/>
+                </a:cubicBezTo>
+                <a:lnTo>
+                  <a:pt x="6857532" y="686333"/>
+                </a:lnTo>
+                <a:lnTo>
+                  <a:pt x="6806927" y="699345"/>
+                </a:lnTo>
+                <a:cubicBezTo>
+                  <a:pt x="6081835" y="924872"/>
+                  <a:pt x="5555365" y="1601212"/>
+                  <a:pt x="5555365" y="2400515"/>
+                </a:cubicBezTo>
+                <a:cubicBezTo>
+                  <a:pt x="5555365" y="3384273"/>
+                  <a:pt x="6352859" y="4181767"/>
+                  <a:pt x="7336617" y="4181767"/>
+                </a:cubicBezTo>
+                <a:lnTo>
+                  <a:pt x="7452815" y="4175900"/>
+                </a:lnTo>
+                <a:lnTo>
+                  <a:pt x="7437456" y="4225378"/>
+                </a:lnTo>
+                <a:cubicBezTo>
+                  <a:pt x="7431436" y="4254794"/>
+                  <a:pt x="7428275" y="4285252"/>
+                  <a:pt x="7428275" y="4316448"/>
+                </a:cubicBezTo>
+                <a:cubicBezTo>
+                  <a:pt x="7428275" y="4534821"/>
+                  <a:pt x="7583172" y="4717015"/>
+                  <a:pt x="7789089" y="4759152"/>
+                </a:cubicBezTo>
+                <a:lnTo>
+                  <a:pt x="7821919" y="4762461"/>
+                </a:lnTo>
+                <a:lnTo>
+                  <a:pt x="7809638" y="4785088"/>
+                </a:lnTo>
+                <a:lnTo>
+                  <a:pt x="7794661" y="4833335"/>
+                </a:lnTo>
+                <a:lnTo>
+                  <a:pt x="7524776" y="4917113"/>
+                </a:lnTo>
+                <a:cubicBezTo>
+                  <a:pt x="7006070" y="5136507"/>
+                  <a:pt x="6642110" y="5650122"/>
+                  <a:pt x="6642110" y="6248746"/>
+                </a:cubicBezTo>
+                <a:cubicBezTo>
+                  <a:pt x="6642110" y="6448287"/>
+                  <a:pt x="6682550" y="6638383"/>
+                  <a:pt x="6755682" y="6811285"/>
+                </a:cubicBezTo>
+                <a:lnTo>
+                  <a:pt x="6778185" y="6858000"/>
+                </a:lnTo>
+                <a:lnTo>
+                  <a:pt x="0" y="6858000"/>
+                </a:lnTo>
+                <a:close/>
+              </a:path>
+            </a:pathLst>
+          </a:custGeom>
+          <a:gradFill>
+            <a:gsLst>
+              <a:gs pos="25996">
+                <a:srgbClr val="1F2D29">
+                  <a:alpha val="4000"/>
+                </a:srgbClr>
+              </a:gs>
+              <a:gs pos="20000">
+                <a:schemeClr val="bg2">
+                  <a:alpha val="0"/>
+                </a:schemeClr>
+              </a:gs>
+              <a:gs pos="100000">
+                <a:schemeClr val="bg2"/>
+              </a:gs>
+            </a:gsLst>
+            <a:lin ang="10800000" scaled="1"/>
+          </a:gradFill>
+          <a:ln>
+            <a:noFill/>
+          </a:ln>
+        </p:spPr>
+        <p:style>
+          <a:lnRef idx="2">
+            <a:schemeClr val="accent1">
+              <a:shade val="50000"/>
+            </a:schemeClr>
+          </a:lnRef>
+          <a:fillRef idx="1">
+            <a:schemeClr val="accent1"/>
+          </a:fillRef>
+          <a:effectRef idx="0">
+            <a:schemeClr val="accent1"/>
+          </a:effectRef>
+          <a:fontRef idx="minor">
+            <a:schemeClr val="lt1"/>
+          </a:fontRef>
+        </p:style>
+      </p:sp>
+      <p:sp>
+        <p:nvSpPr>
+          <p:cNvPr id="34" name="Oval 33">
+            <a:extLst>
+              <a:ext uri="{FF2B5EF4-FFF2-40B4-BE49-F238E27FC236}">
+                <a16:creationId xmlns:a16="http://schemas.microsoft.com/office/drawing/2014/main" id="{332A6F87-AC28-4AA8-B8A6-AEBC67BD0D64}"/>
+              </a:ext>
+              <a:ext uri="{C183D7F6-B498-43B3-948B-1728B52AA6E4}">
+                <adec:decorative xmlns:adec="http://schemas.microsoft.com/office/drawing/2017/decorative" val="1"/>
+              </a:ext>
+            </a:extLst>
+          </p:cNvPr>
+          <p:cNvSpPr>
+            <a:spLocks noGrp="1" noRot="1" noChangeAspect="1" noMove="1" noResize="1" noEditPoints="1" noAdjustHandles="1" noChangeArrowheads="1" noChangeShapeType="1" noTextEdit="1"/>
+          </p:cNvSpPr>
+          <p:nvPr>
+            <p:extLst>
+              <p:ext uri="{386F3935-93C4-4BCD-93E2-E3B085C9AB24}">
+                <p16:designElem xmlns:p16="http://schemas.microsoft.com/office/powerpoint/2015/main" val="1"/>
+              </p:ext>
+            </p:extLst>
+          </p:nvPr>
+        </p:nvSpPr>
+        <p:spPr>
+          <a:xfrm>
+            <a:off x="1547567" y="2282700"/>
+            <a:ext cx="967148" cy="967148"/>
+          </a:xfrm>
+          <a:prstGeom prst="ellipse">
+            <a:avLst/>
+          </a:prstGeom>
+          <a:gradFill>
+            <a:gsLst>
+              <a:gs pos="0">
+                <a:schemeClr val="bg2">
+                  <a:alpha val="0"/>
+                </a:schemeClr>
+              </a:gs>
+              <a:gs pos="100000">
+                <a:schemeClr val="accent1">
+                  <a:alpha val="21000"/>
+                </a:schemeClr>
+              </a:gs>
+            </a:gsLst>
+            <a:lin ang="10800000" scaled="1"/>
+          </a:gradFill>
+          <a:ln>
+            <a:noFill/>
+          </a:ln>
+        </p:spPr>
+        <p:style>
+          <a:lnRef idx="2">
+            <a:schemeClr val="accent1">
+              <a:shade val="50000"/>
+            </a:schemeClr>
+          </a:lnRef>
+          <a:fillRef idx="1">
+            <a:schemeClr val="accent1"/>
+          </a:fillRef>
+          <a:effectRef idx="0">
+            <a:schemeClr val="accent1"/>
+          </a:effectRef>
+          <a:fontRef idx="minor">
+            <a:schemeClr val="lt1"/>
+          </a:fontRef>
+        </p:style>
+        <p:txBody>
+          <a:bodyPr rtlCol="0" anchor="ctr"/>
+          <a:lstStyle/>
+          <a:p>
+            <a:pPr algn="ctr"/>
+            <a:endParaRPr lang="en-US"/>
+          </a:p>
+        </p:txBody>
+      </p:sp>
+      <p:sp>
+        <p:nvSpPr>
+          <p:cNvPr id="2" name="Title 1">
+            <a:extLst>
+              <a:ext uri="{FF2B5EF4-FFF2-40B4-BE49-F238E27FC236}">
+                <a16:creationId xmlns:a16="http://schemas.microsoft.com/office/drawing/2014/main" id="{ECFDD4CF-A627-446E-8C95-EEECBD1CEAC4}"/>
+              </a:ext>
+            </a:extLst>
+          </p:cNvPr>
+          <p:cNvSpPr>
+            <a:spLocks noGrp="1"/>
+          </p:cNvSpPr>
+          <p:nvPr>
+            <p:ph type="title"/>
+          </p:nvPr>
+        </p:nvSpPr>
+        <p:spPr>
+          <a:xfrm>
+            <a:off x="2193167" y="2590984"/>
+            <a:ext cx="7369642" cy="3608480"/>
+          </a:xfrm>
+        </p:spPr>
+        <p:txBody>
+          <a:bodyPr vert="horz" lIns="91440" tIns="45720" rIns="91440" bIns="45720" rtlCol="0" anchor="t">
+            <a:normAutofit/>
+          </a:bodyPr>
+          <a:lstStyle/>
+          <a:p>
+            <a:pPr algn="l"/>
+            <a:r>
+              <a:rPr lang="en-US" sz="8000"/>
+              <a:t>Any questions?</a:t>
+            </a:r>
+          </a:p>
+        </p:txBody>
+      </p:sp>
+      <p:sp>
+        <p:nvSpPr>
+          <p:cNvPr id="3" name="Text Placeholder 2">
+            <a:extLst>
+              <a:ext uri="{FF2B5EF4-FFF2-40B4-BE49-F238E27FC236}">
+                <a16:creationId xmlns:a16="http://schemas.microsoft.com/office/drawing/2014/main" id="{E7720AE2-F39C-4E1D-9B89-0CC53FE270F5}"/>
+              </a:ext>
+            </a:extLst>
+          </p:cNvPr>
+          <p:cNvSpPr>
+            <a:spLocks noGrp="1"/>
+          </p:cNvSpPr>
+          <p:nvPr>
+            <p:ph type="body" idx="1"/>
+          </p:nvPr>
+        </p:nvSpPr>
+        <p:spPr>
+          <a:xfrm>
+            <a:off x="2193168" y="1079212"/>
+            <a:ext cx="6437630" cy="1335503"/>
+          </a:xfrm>
+        </p:spPr>
+        <p:txBody>
+          <a:bodyPr vert="horz" lIns="91440" tIns="0" rIns="91440" bIns="45720" rtlCol="0" anchor="b">
+            <a:normAutofit/>
+          </a:bodyPr>
+          <a:lstStyle/>
+          <a:p>
+            <a:pPr algn="l"/>
+            <a:r>
+              <a:rPr lang="en-US" sz="2800"/>
+              <a:t>Thank you!</a:t>
+            </a:r>
+          </a:p>
+        </p:txBody>
+      </p:sp>
+    </p:spTree>
+    <p:extLst>
+      <p:ext uri="{BB962C8B-B14F-4D97-AF65-F5344CB8AC3E}">
+        <p14:creationId xmlns:p14="http://schemas.microsoft.com/office/powerpoint/2010/main" val="2596564708"/>
       </p:ext>
     </p:extLst>
   </p:cSld>

</xml_diff>